<commit_message>
Updates to the intro-slides
</commit_message>
<xml_diff>
--- a/doc/website/doc/slides.pptx
+++ b/doc/website/doc/slides.pptx
@@ -1,19 +1,19 @@
 
 <file path=ppt/presentation.xml><?xml version="1.0" encoding="utf-8"?>
-<p:presentation xmlns:a="http://schemas.openxmlformats.org/drawingml/2006/main" xmlns:r="http://schemas.openxmlformats.org/officeDocument/2006/relationships" xmlns:mc="http://schemas.openxmlformats.org/markup-compatibility/2006" xmlns:mv="urn:schemas-microsoft-com:mac:vml" xmlns:p="http://schemas.openxmlformats.org/presentationml/2006/main" xmlns:c="http://schemas.openxmlformats.org/drawingml/2006/chart" xmlns:dgm="http://schemas.openxmlformats.org/drawingml/2006/diagram" xmlns:o="urn:schemas-microsoft-com:office:office" xmlns:v="urn:schemas-microsoft-com:vml" xmlns:pvml="urn:schemas-microsoft-com:office:powerpoint" xmlns:com="http://schemas.openxmlformats.org/drawingml/2006/compatibility" xmlns:p14="http://schemas.microsoft.com/office/powerpoint/2010/main" saveSubsetFonts="1" autoCompressPictures="0" strictFirstAndLastChars="0" showSpecialPlsOnTitleSld="0" firstSlideNum="0">
+<p:presentation xmlns:a="http://schemas.openxmlformats.org/drawingml/2006/main" xmlns:r="http://schemas.openxmlformats.org/officeDocument/2006/relationships" xmlns:p="http://schemas.openxmlformats.org/presentationml/2006/main" firstSlideNum="0" showSpecialPlsOnTitleSld="0" strictFirstAndLastChars="0" saveSubsetFonts="1" autoCompressPictures="0">
   <p:sldMasterIdLst>
-    <p:sldMasterId id="2147483653" r:id="rId4"/>
+    <p:sldMasterId id="2147483653" r:id="rId1"/>
   </p:sldMasterIdLst>
   <p:notesMasterIdLst>
-    <p:notesMasterId r:id="rId5"/>
+    <p:notesMasterId r:id="rId3"/>
   </p:notesMasterIdLst>
   <p:sldIdLst>
-    <p:sldId id="256" r:id="rId6"/>
+    <p:sldId id="256" r:id="rId2"/>
   </p:sldIdLst>
-  <p:sldSz cy="7620000" cx="10160000"/>
-  <p:notesSz cy="10160000" cx="7620000"/>
+  <p:sldSz cx="10160000" cy="7620000"/>
+  <p:notesSz cx="7620000" cy="10160000"/>
   <p:defaultTextStyle>
-    <a:defPPr algn="l" rtl="0" marR="0">
+    <a:defPPr marR="0" algn="l" rtl="0">
       <a:lnSpc>
         <a:spcPct val="100000"/>
       </a:lnSpc>
@@ -24,7 +24,7 @@
         <a:spcPts val="0"/>
       </a:spcAft>
     </a:defPPr>
-    <a:lvl1pPr algn="l" rtl="0" marR="0">
+    <a:lvl1pPr marR="0" algn="l" rtl="0">
       <a:lnSpc>
         <a:spcPct val="100000"/>
       </a:lnSpc>
@@ -35,7 +35,7 @@
         <a:spcPts val="0"/>
       </a:spcAft>
       <a:buNone/>
-      <a:defRPr strike="noStrike" u="none" b="0" cap="none" baseline="0" sz="1400" i="0">
+      <a:defRPr sz="1400" b="0" i="0" u="none" strike="noStrike" cap="none" baseline="0">
         <a:solidFill>
           <a:srgbClr val="000000"/>
         </a:solidFill>
@@ -46,7 +46,7 @@
         <a:rtl val="0"/>
       </a:defRPr>
     </a:lvl1pPr>
-    <a:lvl2pPr algn="l" rtl="0" marR="0">
+    <a:lvl2pPr marR="0" algn="l" rtl="0">
       <a:lnSpc>
         <a:spcPct val="100000"/>
       </a:lnSpc>
@@ -57,7 +57,7 @@
         <a:spcPts val="0"/>
       </a:spcAft>
       <a:buNone/>
-      <a:defRPr strike="noStrike" u="none" b="0" cap="none" baseline="0" sz="1400" i="0">
+      <a:defRPr sz="1400" b="0" i="0" u="none" strike="noStrike" cap="none" baseline="0">
         <a:solidFill>
           <a:srgbClr val="000000"/>
         </a:solidFill>
@@ -68,7 +68,7 @@
         <a:rtl val="0"/>
       </a:defRPr>
     </a:lvl2pPr>
-    <a:lvl3pPr algn="l" rtl="0" marR="0">
+    <a:lvl3pPr marR="0" algn="l" rtl="0">
       <a:lnSpc>
         <a:spcPct val="100000"/>
       </a:lnSpc>
@@ -79,7 +79,7 @@
         <a:spcPts val="0"/>
       </a:spcAft>
       <a:buNone/>
-      <a:defRPr strike="noStrike" u="none" b="0" cap="none" baseline="0" sz="1400" i="0">
+      <a:defRPr sz="1400" b="0" i="0" u="none" strike="noStrike" cap="none" baseline="0">
         <a:solidFill>
           <a:srgbClr val="000000"/>
         </a:solidFill>
@@ -90,7 +90,7 @@
         <a:rtl val="0"/>
       </a:defRPr>
     </a:lvl3pPr>
-    <a:lvl4pPr algn="l" rtl="0" marR="0">
+    <a:lvl4pPr marR="0" algn="l" rtl="0">
       <a:lnSpc>
         <a:spcPct val="100000"/>
       </a:lnSpc>
@@ -101,7 +101,7 @@
         <a:spcPts val="0"/>
       </a:spcAft>
       <a:buNone/>
-      <a:defRPr strike="noStrike" u="none" b="0" cap="none" baseline="0" sz="1400" i="0">
+      <a:defRPr sz="1400" b="0" i="0" u="none" strike="noStrike" cap="none" baseline="0">
         <a:solidFill>
           <a:srgbClr val="000000"/>
         </a:solidFill>
@@ -112,7 +112,7 @@
         <a:rtl val="0"/>
       </a:defRPr>
     </a:lvl4pPr>
-    <a:lvl5pPr algn="l" rtl="0" marR="0">
+    <a:lvl5pPr marR="0" algn="l" rtl="0">
       <a:lnSpc>
         <a:spcPct val="100000"/>
       </a:lnSpc>
@@ -123,7 +123,7 @@
         <a:spcPts val="0"/>
       </a:spcAft>
       <a:buNone/>
-      <a:defRPr strike="noStrike" u="none" b="0" cap="none" baseline="0" sz="1400" i="0">
+      <a:defRPr sz="1400" b="0" i="0" u="none" strike="noStrike" cap="none" baseline="0">
         <a:solidFill>
           <a:srgbClr val="000000"/>
         </a:solidFill>
@@ -134,7 +134,7 @@
         <a:rtl val="0"/>
       </a:defRPr>
     </a:lvl5pPr>
-    <a:lvl6pPr algn="l" rtl="0" marR="0">
+    <a:lvl6pPr marR="0" algn="l" rtl="0">
       <a:lnSpc>
         <a:spcPct val="100000"/>
       </a:lnSpc>
@@ -145,7 +145,7 @@
         <a:spcPts val="0"/>
       </a:spcAft>
       <a:buNone/>
-      <a:defRPr strike="noStrike" u="none" b="0" cap="none" baseline="0" sz="1400" i="0">
+      <a:defRPr sz="1400" b="0" i="0" u="none" strike="noStrike" cap="none" baseline="0">
         <a:solidFill>
           <a:srgbClr val="000000"/>
         </a:solidFill>
@@ -156,7 +156,7 @@
         <a:rtl val="0"/>
       </a:defRPr>
     </a:lvl6pPr>
-    <a:lvl7pPr algn="l" rtl="0" marR="0">
+    <a:lvl7pPr marR="0" algn="l" rtl="0">
       <a:lnSpc>
         <a:spcPct val="100000"/>
       </a:lnSpc>
@@ -167,7 +167,7 @@
         <a:spcPts val="0"/>
       </a:spcAft>
       <a:buNone/>
-      <a:defRPr strike="noStrike" u="none" b="0" cap="none" baseline="0" sz="1400" i="0">
+      <a:defRPr sz="1400" b="0" i="0" u="none" strike="noStrike" cap="none" baseline="0">
         <a:solidFill>
           <a:srgbClr val="000000"/>
         </a:solidFill>
@@ -178,7 +178,7 @@
         <a:rtl val="0"/>
       </a:defRPr>
     </a:lvl7pPr>
-    <a:lvl8pPr algn="l" rtl="0" marR="0">
+    <a:lvl8pPr marR="0" algn="l" rtl="0">
       <a:lnSpc>
         <a:spcPct val="100000"/>
       </a:lnSpc>
@@ -189,7 +189,7 @@
         <a:spcPts val="0"/>
       </a:spcAft>
       <a:buNone/>
-      <a:defRPr strike="noStrike" u="none" b="0" cap="none" baseline="0" sz="1400" i="0">
+      <a:defRPr sz="1400" b="0" i="0" u="none" strike="noStrike" cap="none" baseline="0">
         <a:solidFill>
           <a:srgbClr val="000000"/>
         </a:solidFill>
@@ -200,7 +200,7 @@
         <a:rtl val="0"/>
       </a:defRPr>
     </a:lvl8pPr>
-    <a:lvl9pPr algn="l" rtl="0" marR="0">
+    <a:lvl9pPr marR="0" algn="l" rtl="0">
       <a:lnSpc>
         <a:spcPct val="100000"/>
       </a:lnSpc>
@@ -211,7 +211,7 @@
         <a:spcPts val="0"/>
       </a:spcAft>
       <a:buNone/>
-      <a:defRPr strike="noStrike" u="none" b="0" cap="none" baseline="0" sz="1400" i="0">
+      <a:defRPr sz="1400" b="0" i="0" u="none" strike="noStrike" cap="none" baseline="0">
         <a:solidFill>
           <a:srgbClr val="000000"/>
         </a:solidFill>
@@ -227,8 +227,13 @@
 </file>
 
 <file path=ppt/notesMasters/notesMaster1.xml><?xml version="1.0" encoding="utf-8"?>
-<p:notesMaster xmlns:a="http://schemas.openxmlformats.org/drawingml/2006/main" xmlns:r="http://schemas.openxmlformats.org/officeDocument/2006/relationships" xmlns:mc="http://schemas.openxmlformats.org/markup-compatibility/2006" xmlns:mv="urn:schemas-microsoft-com:mac:vml" xmlns:p="http://schemas.openxmlformats.org/presentationml/2006/main" xmlns:c="http://schemas.openxmlformats.org/drawingml/2006/chart" xmlns:dgm="http://schemas.openxmlformats.org/drawingml/2006/diagram" xmlns:o="urn:schemas-microsoft-com:office:office" xmlns:v="urn:schemas-microsoft-com:vml" xmlns:pvml="urn:schemas-microsoft-com:office:powerpoint" xmlns:com="http://schemas.openxmlformats.org/drawingml/2006/compatibility" xmlns:p14="http://schemas.microsoft.com/office/powerpoint/2010/main">
+<p:notesMaster xmlns:a="http://schemas.openxmlformats.org/drawingml/2006/main" xmlns:r="http://schemas.openxmlformats.org/officeDocument/2006/relationships" xmlns:p="http://schemas.openxmlformats.org/presentationml/2006/main">
   <p:cSld>
+    <p:bg>
+      <p:bgRef idx="1001">
+        <a:schemeClr val="bg1"/>
+      </p:bgRef>
+    </p:bg>
     <p:spTree>
       <p:nvGrpSpPr>
         <p:cNvPr id="1" name="Shape 1"/>
@@ -237,39 +242,46 @@
       </p:nvGrpSpPr>
       <p:grpSpPr>
         <a:xfrm>
-          <a:off y="0" x="0"/>
-          <a:ext cy="0" cx="0"/>
-          <a:chOff y="0" x="0"/>
-          <a:chExt cy="0" cx="0"/>
+          <a:off x="0" y="0"/>
+          <a:ext cx="0" cy="0"/>
+          <a:chOff x="0" y="0"/>
+          <a:chExt cx="0" cy="0"/>
         </a:xfrm>
       </p:grpSpPr>
       <p:sp>
         <p:nvSpPr>
           <p:cNvPr id="2" name="Shape 2"/>
-          <p:cNvSpPr/>
+          <p:cNvSpPr>
+            <a:spLocks noGrp="1" noRot="1" noChangeAspect="1"/>
+          </p:cNvSpPr>
           <p:nvPr>
-            <p:ph idx="2" type="sldImg"/>
+            <p:ph type="sldImg" idx="2"/>
           </p:nvPr>
         </p:nvSpPr>
         <p:spPr>
           <a:xfrm>
-            <a:off y="762000" x="1270250"/>
-            <a:ext cy="3809999" cx="5080250"/>
+            <a:off x="1270250" y="762000"/>
+            <a:ext cx="5080250" cy="3809999"/>
           </a:xfrm>
           <a:custGeom>
+            <a:avLst/>
+            <a:gdLst/>
+            <a:ahLst/>
+            <a:cxnLst/>
+            <a:rect l="0" t="0" r="0" b="0"/>
             <a:pathLst>
-              <a:path w="120000" extrusionOk="0" h="120000">
+              <a:path w="120000" h="120000" extrusionOk="0">
                 <a:moveTo>
-                  <a:pt y="0" x="0"/>
+                  <a:pt x="0" y="0"/>
                 </a:moveTo>
                 <a:lnTo>
-                  <a:pt y="0" x="120000"/>
+                  <a:pt x="120000" y="0"/>
                 </a:lnTo>
                 <a:lnTo>
-                  <a:pt y="120000" x="120000"/>
+                  <a:pt x="120000" y="120000"/>
                 </a:lnTo>
                 <a:lnTo>
-                  <a:pt y="120000" x="0"/>
+                  <a:pt x="0" y="120000"/>
                 </a:lnTo>
                 <a:close/>
               </a:path>
@@ -282,23 +294,25 @@
             </a:solidFill>
             <a:prstDash val="solid"/>
             <a:round/>
-            <a:headEnd w="med" len="med" type="none"/>
-            <a:tailEnd w="med" len="med" type="none"/>
+            <a:headEnd type="none" w="med" len="med"/>
+            <a:tailEnd type="none" w="med" len="med"/>
           </a:ln>
         </p:spPr>
       </p:sp>
       <p:sp>
         <p:nvSpPr>
           <p:cNvPr id="3" name="Shape 3"/>
-          <p:cNvSpPr txBox="1"/>
+          <p:cNvSpPr txBox="1">
+            <a:spLocks noGrp="1"/>
+          </p:cNvSpPr>
           <p:nvPr>
-            <p:ph idx="1" type="body"/>
+            <p:ph type="body" idx="1"/>
           </p:nvPr>
         </p:nvSpPr>
         <p:spPr>
           <a:xfrm>
-            <a:off y="4826000" x="762000"/>
-            <a:ext cy="4572000" cx="6096000"/>
+            <a:off x="762000" y="4826000"/>
+            <a:ext cx="6096000" cy="4572000"/>
           </a:xfrm>
           <a:prstGeom prst="rect">
             <a:avLst/>
@@ -309,7 +323,7 @@
           </a:ln>
         </p:spPr>
         <p:txBody>
-          <a:bodyPr bIns="91425" rIns="91425" lIns="91425" tIns="91425" anchor="t" anchorCtr="0"/>
+          <a:bodyPr lIns="91425" tIns="91425" rIns="91425" bIns="91425" anchor="t" anchorCtr="0"/>
           <a:lstStyle>
             <a:lvl1pPr>
               <a:spcBef>
@@ -366,59 +380,165 @@
               <a:defRPr sz="1100"/>
             </a:lvl9pPr>
           </a:lstStyle>
-          <a:p/>
+          <a:p>
+            <a:endParaRPr/>
+          </a:p>
         </p:txBody>
       </p:sp>
     </p:spTree>
+    <p:extLst>
+      <p:ext uri="{BB962C8B-B14F-4D97-AF65-F5344CB8AC3E}">
+        <p14:creationId xmlns:p14="http://schemas.microsoft.com/office/powerpoint/2010/main" val="1459576520"/>
+      </p:ext>
+    </p:extLst>
   </p:cSld>
-  <p:clrMap accent2="accent2" accent3="accent3" accent4="accent4" accent5="accent5" accent6="accent6" hlink="hlink" tx2="lt2" tx1="dk1" bg2="dk2" bg1="lt1" folHlink="folHlink" accent1="accent1"/>
+  <p:clrMap bg1="lt1" tx1="dk1" bg2="dk2" tx2="lt2" accent1="accent1" accent2="accent2" accent3="accent3" accent4="accent4" accent5="accent5" accent6="accent6" hlink="hlink" folHlink="folHlink"/>
+  <p:notesStyle>
+    <a:lvl1pPr marL="0" algn="l" defTabSz="457200" rtl="0" eaLnBrk="1" latinLnBrk="0" hangingPunct="1">
+      <a:defRPr sz="1200" kern="1200">
+        <a:solidFill>
+          <a:schemeClr val="tx1"/>
+        </a:solidFill>
+        <a:latin typeface="+mn-lt"/>
+        <a:ea typeface="+mn-ea"/>
+        <a:cs typeface="+mn-cs"/>
+      </a:defRPr>
+    </a:lvl1pPr>
+    <a:lvl2pPr marL="457200" algn="l" defTabSz="457200" rtl="0" eaLnBrk="1" latinLnBrk="0" hangingPunct="1">
+      <a:defRPr sz="1200" kern="1200">
+        <a:solidFill>
+          <a:schemeClr val="tx1"/>
+        </a:solidFill>
+        <a:latin typeface="+mn-lt"/>
+        <a:ea typeface="+mn-ea"/>
+        <a:cs typeface="+mn-cs"/>
+      </a:defRPr>
+    </a:lvl2pPr>
+    <a:lvl3pPr marL="914400" algn="l" defTabSz="457200" rtl="0" eaLnBrk="1" latinLnBrk="0" hangingPunct="1">
+      <a:defRPr sz="1200" kern="1200">
+        <a:solidFill>
+          <a:schemeClr val="tx1"/>
+        </a:solidFill>
+        <a:latin typeface="+mn-lt"/>
+        <a:ea typeface="+mn-ea"/>
+        <a:cs typeface="+mn-cs"/>
+      </a:defRPr>
+    </a:lvl3pPr>
+    <a:lvl4pPr marL="1371600" algn="l" defTabSz="457200" rtl="0" eaLnBrk="1" latinLnBrk="0" hangingPunct="1">
+      <a:defRPr sz="1200" kern="1200">
+        <a:solidFill>
+          <a:schemeClr val="tx1"/>
+        </a:solidFill>
+        <a:latin typeface="+mn-lt"/>
+        <a:ea typeface="+mn-ea"/>
+        <a:cs typeface="+mn-cs"/>
+      </a:defRPr>
+    </a:lvl4pPr>
+    <a:lvl5pPr marL="1828800" algn="l" defTabSz="457200" rtl="0" eaLnBrk="1" latinLnBrk="0" hangingPunct="1">
+      <a:defRPr sz="1200" kern="1200">
+        <a:solidFill>
+          <a:schemeClr val="tx1"/>
+        </a:solidFill>
+        <a:latin typeface="+mn-lt"/>
+        <a:ea typeface="+mn-ea"/>
+        <a:cs typeface="+mn-cs"/>
+      </a:defRPr>
+    </a:lvl5pPr>
+    <a:lvl6pPr marL="2286000" algn="l" defTabSz="457200" rtl="0" eaLnBrk="1" latinLnBrk="0" hangingPunct="1">
+      <a:defRPr sz="1200" kern="1200">
+        <a:solidFill>
+          <a:schemeClr val="tx1"/>
+        </a:solidFill>
+        <a:latin typeface="+mn-lt"/>
+        <a:ea typeface="+mn-ea"/>
+        <a:cs typeface="+mn-cs"/>
+      </a:defRPr>
+    </a:lvl6pPr>
+    <a:lvl7pPr marL="2743200" algn="l" defTabSz="457200" rtl="0" eaLnBrk="1" latinLnBrk="0" hangingPunct="1">
+      <a:defRPr sz="1200" kern="1200">
+        <a:solidFill>
+          <a:schemeClr val="tx1"/>
+        </a:solidFill>
+        <a:latin typeface="+mn-lt"/>
+        <a:ea typeface="+mn-ea"/>
+        <a:cs typeface="+mn-cs"/>
+      </a:defRPr>
+    </a:lvl7pPr>
+    <a:lvl8pPr marL="3200400" algn="l" defTabSz="457200" rtl="0" eaLnBrk="1" latinLnBrk="0" hangingPunct="1">
+      <a:defRPr sz="1200" kern="1200">
+        <a:solidFill>
+          <a:schemeClr val="tx1"/>
+        </a:solidFill>
+        <a:latin typeface="+mn-lt"/>
+        <a:ea typeface="+mn-ea"/>
+        <a:cs typeface="+mn-cs"/>
+      </a:defRPr>
+    </a:lvl8pPr>
+    <a:lvl9pPr marL="3657600" algn="l" defTabSz="457200" rtl="0" eaLnBrk="1" latinLnBrk="0" hangingPunct="1">
+      <a:defRPr sz="1200" kern="1200">
+        <a:solidFill>
+          <a:schemeClr val="tx1"/>
+        </a:solidFill>
+        <a:latin typeface="+mn-lt"/>
+        <a:ea typeface="+mn-ea"/>
+        <a:cs typeface="+mn-cs"/>
+      </a:defRPr>
+    </a:lvl9pPr>
+  </p:notesStyle>
 </p:notesMaster>
 </file>
 
 <file path=ppt/notesSlides/notesSlide1.xml><?xml version="1.0" encoding="utf-8"?>
-<p:notes xmlns:a="http://schemas.openxmlformats.org/drawingml/2006/main" xmlns:r="http://schemas.openxmlformats.org/officeDocument/2006/relationships" xmlns:mc="http://schemas.openxmlformats.org/markup-compatibility/2006" xmlns:mv="urn:schemas-microsoft-com:mac:vml" xmlns:p="http://schemas.openxmlformats.org/presentationml/2006/main" xmlns:c="http://schemas.openxmlformats.org/drawingml/2006/chart" xmlns:dgm="http://schemas.openxmlformats.org/drawingml/2006/diagram" xmlns:o="urn:schemas-microsoft-com:office:office" xmlns:v="urn:schemas-microsoft-com:vml" xmlns:pvml="urn:schemas-microsoft-com:office:powerpoint" xmlns:com="http://schemas.openxmlformats.org/drawingml/2006/compatibility" xmlns:p14="http://schemas.microsoft.com/office/powerpoint/2010/main" showMasterSp="0" showMasterPhAnim="0">
+<p:notes xmlns:a="http://schemas.openxmlformats.org/drawingml/2006/main" xmlns:r="http://schemas.openxmlformats.org/officeDocument/2006/relationships" xmlns:p="http://schemas.openxmlformats.org/presentationml/2006/main" showMasterSp="0" showMasterPhAnim="0">
   <p:cSld>
     <p:spTree>
       <p:nvGrpSpPr>
-        <p:cNvPr id="22" name="Shape 22"/>
+        <p:cNvPr id="1" name="Shape 22"/>
         <p:cNvGrpSpPr/>
         <p:nvPr/>
       </p:nvGrpSpPr>
       <p:grpSpPr>
         <a:xfrm>
-          <a:off y="0" x="0"/>
-          <a:ext cy="0" cx="0"/>
-          <a:chOff y="0" x="0"/>
-          <a:chExt cy="0" cx="0"/>
+          <a:off x="0" y="0"/>
+          <a:ext cx="0" cy="0"/>
+          <a:chOff x="0" y="0"/>
+          <a:chExt cx="0" cy="0"/>
         </a:xfrm>
       </p:grpSpPr>
       <p:sp>
         <p:nvSpPr>
           <p:cNvPr id="23" name="Shape 23"/>
-          <p:cNvSpPr/>
+          <p:cNvSpPr>
+            <a:spLocks noGrp="1" noRot="1" noChangeAspect="1"/>
+          </p:cNvSpPr>
           <p:nvPr>
-            <p:ph idx="2" type="sldImg"/>
+            <p:ph type="sldImg" idx="2"/>
           </p:nvPr>
         </p:nvSpPr>
         <p:spPr>
           <a:xfrm>
-            <a:off y="762000" x="1270250"/>
-            <a:ext cy="3809999" cx="5080250"/>
+            <a:off x="1270000" y="762000"/>
+            <a:ext cx="5080000" cy="3810000"/>
           </a:xfrm>
           <a:custGeom>
+            <a:avLst/>
+            <a:gdLst/>
+            <a:ahLst/>
+            <a:cxnLst/>
+            <a:rect l="0" t="0" r="0" b="0"/>
             <a:pathLst>
-              <a:path w="120000" extrusionOk="0" h="120000">
+              <a:path w="120000" h="120000" extrusionOk="0">
                 <a:moveTo>
-                  <a:pt y="0" x="0"/>
+                  <a:pt x="0" y="0"/>
                 </a:moveTo>
                 <a:lnTo>
-                  <a:pt y="0" x="120000"/>
+                  <a:pt x="120000" y="0"/>
                 </a:lnTo>
                 <a:lnTo>
-                  <a:pt y="120000" x="120000"/>
+                  <a:pt x="120000" y="120000"/>
                 </a:lnTo>
                 <a:lnTo>
-                  <a:pt y="120000" x="0"/>
+                  <a:pt x="0" y="120000"/>
                 </a:lnTo>
                 <a:close/>
               </a:path>
@@ -431,30 +551,32 @@
             </a:solidFill>
             <a:prstDash val="solid"/>
             <a:round/>
-            <a:headEnd w="med" len="med" type="none"/>
-            <a:tailEnd w="med" len="med" type="none"/>
+            <a:headEnd type="none" w="med" len="med"/>
+            <a:tailEnd type="none" w="med" len="med"/>
           </a:ln>
         </p:spPr>
       </p:sp>
       <p:sp>
         <p:nvSpPr>
           <p:cNvPr id="24" name="Shape 24"/>
-          <p:cNvSpPr txBox="1"/>
+          <p:cNvSpPr txBox="1">
+            <a:spLocks noGrp="1"/>
+          </p:cNvSpPr>
           <p:nvPr>
-            <p:ph idx="1" type="body"/>
+            <p:ph type="body" idx="1"/>
           </p:nvPr>
         </p:nvSpPr>
         <p:spPr>
           <a:xfrm>
-            <a:off y="4826000" x="762000"/>
-            <a:ext cy="4572000" cx="6096000"/>
+            <a:off x="762000" y="4826000"/>
+            <a:ext cx="6096000" cy="4572000"/>
           </a:xfrm>
           <a:prstGeom prst="rect">
             <a:avLst/>
           </a:prstGeom>
         </p:spPr>
         <p:txBody>
-          <a:bodyPr bIns="91425" rIns="91425" lIns="91425" tIns="91425" anchor="t" anchorCtr="0">
+          <a:bodyPr lIns="91425" tIns="91425" rIns="91425" bIns="91425" anchor="t" anchorCtr="0">
             <a:spAutoFit/>
           </a:bodyPr>
           <a:lstStyle/>
@@ -465,9 +587,6 @@
               </a:spcBef>
               <a:buNone/>
             </a:pPr>
-            <a:r>
-              <a:t/>
-            </a:r>
             <a:endParaRPr sz="1466"/>
           </a:p>
         </p:txBody>
@@ -481,20 +600,20 @@
 </file>
 
 <file path=ppt/slideLayouts/slideLayout1.xml><?xml version="1.0" encoding="utf-8"?>
-<p:sldLayout xmlns:a="http://schemas.openxmlformats.org/drawingml/2006/main" xmlns:r="http://schemas.openxmlformats.org/officeDocument/2006/relationships" xmlns:mc="http://schemas.openxmlformats.org/markup-compatibility/2006" xmlns:mv="urn:schemas-microsoft-com:mac:vml" xmlns:p="http://schemas.openxmlformats.org/presentationml/2006/main" xmlns:c="http://schemas.openxmlformats.org/drawingml/2006/chart" xmlns:dgm="http://schemas.openxmlformats.org/drawingml/2006/diagram" xmlns:o="urn:schemas-microsoft-com:office:office" xmlns:v="urn:schemas-microsoft-com:vml" xmlns:pvml="urn:schemas-microsoft-com:office:powerpoint" xmlns:com="http://schemas.openxmlformats.org/drawingml/2006/compatibility" xmlns:p14="http://schemas.microsoft.com/office/powerpoint/2010/main" type="blank">
+<p:sldLayout xmlns:a="http://schemas.openxmlformats.org/drawingml/2006/main" xmlns:r="http://schemas.openxmlformats.org/officeDocument/2006/relationships" xmlns:p="http://schemas.openxmlformats.org/presentationml/2006/main" type="blank">
   <p:cSld name="Blank">
     <p:spTree>
       <p:nvGrpSpPr>
-        <p:cNvPr id="5" name="Shape 5"/>
+        <p:cNvPr id="1" name="Shape 5"/>
         <p:cNvGrpSpPr/>
         <p:nvPr/>
       </p:nvGrpSpPr>
       <p:grpSpPr>
         <a:xfrm>
-          <a:off y="0" x="0"/>
-          <a:ext cy="0" cx="0"/>
-          <a:chOff y="0" x="0"/>
-          <a:chExt cy="0" cx="0"/>
+          <a:off x="0" y="0"/>
+          <a:ext cx="0" cy="0"/>
+          <a:chOff x="0" y="0"/>
+          <a:chExt cx="0" cy="0"/>
         </a:xfrm>
       </p:grpSpPr>
     </p:spTree>
@@ -506,34 +625,36 @@
 </file>
 
 <file path=ppt/slideLayouts/slideLayout2.xml><?xml version="1.0" encoding="utf-8"?>
-<p:sldLayout xmlns:a="http://schemas.openxmlformats.org/drawingml/2006/main" xmlns:r="http://schemas.openxmlformats.org/officeDocument/2006/relationships" xmlns:mc="http://schemas.openxmlformats.org/markup-compatibility/2006" xmlns:mv="urn:schemas-microsoft-com:mac:vml" xmlns:p="http://schemas.openxmlformats.org/presentationml/2006/main" xmlns:c="http://schemas.openxmlformats.org/drawingml/2006/chart" xmlns:dgm="http://schemas.openxmlformats.org/drawingml/2006/diagram" xmlns:o="urn:schemas-microsoft-com:office:office" xmlns:v="urn:schemas-microsoft-com:vml" xmlns:pvml="urn:schemas-microsoft-com:office:powerpoint" xmlns:com="http://schemas.openxmlformats.org/drawingml/2006/compatibility" xmlns:p14="http://schemas.microsoft.com/office/powerpoint/2010/main" type="title">
+<p:sldLayout xmlns:a="http://schemas.openxmlformats.org/drawingml/2006/main" xmlns:r="http://schemas.openxmlformats.org/officeDocument/2006/relationships" xmlns:p="http://schemas.openxmlformats.org/presentationml/2006/main" type="title">
   <p:cSld name="Title Slide">
     <p:spTree>
       <p:nvGrpSpPr>
-        <p:cNvPr id="6" name="Shape 6"/>
+        <p:cNvPr id="1" name="Shape 6"/>
         <p:cNvGrpSpPr/>
         <p:nvPr/>
       </p:nvGrpSpPr>
       <p:grpSpPr>
         <a:xfrm>
-          <a:off y="0" x="0"/>
-          <a:ext cy="0" cx="0"/>
-          <a:chOff y="0" x="0"/>
-          <a:chExt cy="0" cx="0"/>
+          <a:off x="0" y="0"/>
+          <a:ext cx="0" cy="0"/>
+          <a:chOff x="0" y="0"/>
+          <a:chExt cx="0" cy="0"/>
         </a:xfrm>
       </p:grpSpPr>
       <p:sp>
         <p:nvSpPr>
           <p:cNvPr id="7" name="Shape 7"/>
-          <p:cNvSpPr txBox="1"/>
+          <p:cNvSpPr txBox="1">
+            <a:spLocks noGrp="1"/>
+          </p:cNvSpPr>
           <p:nvPr>
             <p:ph type="ctrTitle"/>
           </p:nvPr>
         </p:nvSpPr>
         <p:spPr>
           <a:xfrm>
-            <a:off y="3048000" x="914400"/>
-            <a:ext cy="1219199" cx="8331200"/>
+            <a:off x="914400" y="3048000"/>
+            <a:ext cx="8331200" cy="1219199"/>
           </a:xfrm>
           <a:prstGeom prst="rect">
             <a:avLst/>
@@ -544,7 +665,7 @@
           </a:ln>
         </p:spPr>
         <p:txBody>
-          <a:bodyPr bIns="91425" rIns="91425" lIns="91425" tIns="91425" anchor="t" anchorCtr="0"/>
+          <a:bodyPr lIns="91425" tIns="91425" rIns="91425" bIns="91425" anchor="t" anchorCtr="0"/>
           <a:lstStyle>
             <a:lvl1pPr algn="ctr">
               <a:spcBef>
@@ -610,21 +731,25 @@
               <a:defRPr sz="4800"/>
             </a:lvl9pPr>
           </a:lstStyle>
-          <a:p/>
+          <a:p>
+            <a:endParaRPr/>
+          </a:p>
         </p:txBody>
       </p:sp>
       <p:sp>
         <p:nvSpPr>
           <p:cNvPr id="8" name="Shape 8"/>
-          <p:cNvSpPr txBox="1"/>
+          <p:cNvSpPr txBox="1">
+            <a:spLocks noGrp="1"/>
+          </p:cNvSpPr>
           <p:nvPr>
-            <p:ph idx="1" type="subTitle"/>
+            <p:ph type="subTitle" idx="1"/>
           </p:nvPr>
         </p:nvSpPr>
         <p:spPr>
           <a:xfrm>
-            <a:off y="4572000" x="1828800"/>
-            <a:ext cy="914400" cx="6502399"/>
+            <a:off x="1828800" y="4572000"/>
+            <a:ext cx="6502399" cy="914400"/>
           </a:xfrm>
           <a:prstGeom prst="rect">
             <a:avLst/>
@@ -635,7 +760,7 @@
           </a:ln>
         </p:spPr>
         <p:txBody>
-          <a:bodyPr bIns="91425" rIns="91425" lIns="91425" tIns="91425" anchor="t" anchorCtr="0"/>
+          <a:bodyPr lIns="91425" tIns="91425" rIns="91425" bIns="91425" anchor="t" anchorCtr="0"/>
           <a:lstStyle>
             <a:lvl1pPr algn="ctr">
               <a:spcBef>
@@ -701,7 +826,9 @@
               <a:defRPr sz="3200"/>
             </a:lvl9pPr>
           </a:lstStyle>
-          <a:p/>
+          <a:p>
+            <a:endParaRPr/>
+          </a:p>
         </p:txBody>
       </p:sp>
     </p:spTree>
@@ -713,34 +840,36 @@
 </file>
 
 <file path=ppt/slideLayouts/slideLayout3.xml><?xml version="1.0" encoding="utf-8"?>
-<p:sldLayout xmlns:a="http://schemas.openxmlformats.org/drawingml/2006/main" xmlns:r="http://schemas.openxmlformats.org/officeDocument/2006/relationships" xmlns:mc="http://schemas.openxmlformats.org/markup-compatibility/2006" xmlns:mv="urn:schemas-microsoft-com:mac:vml" xmlns:p="http://schemas.openxmlformats.org/presentationml/2006/main" xmlns:c="http://schemas.openxmlformats.org/drawingml/2006/chart" xmlns:dgm="http://schemas.openxmlformats.org/drawingml/2006/diagram" xmlns:o="urn:schemas-microsoft-com:office:office" xmlns:v="urn:schemas-microsoft-com:vml" xmlns:pvml="urn:schemas-microsoft-com:office:powerpoint" xmlns:com="http://schemas.openxmlformats.org/drawingml/2006/compatibility" xmlns:p14="http://schemas.microsoft.com/office/powerpoint/2010/main" type="tx">
+<p:sldLayout xmlns:a="http://schemas.openxmlformats.org/drawingml/2006/main" xmlns:r="http://schemas.openxmlformats.org/officeDocument/2006/relationships" xmlns:p="http://schemas.openxmlformats.org/presentationml/2006/main" type="tx">
   <p:cSld name="Title and Body">
     <p:spTree>
       <p:nvGrpSpPr>
-        <p:cNvPr id="9" name="Shape 9"/>
+        <p:cNvPr id="1" name="Shape 9"/>
         <p:cNvGrpSpPr/>
         <p:nvPr/>
       </p:nvGrpSpPr>
       <p:grpSpPr>
         <a:xfrm>
-          <a:off y="0" x="0"/>
-          <a:ext cy="0" cx="0"/>
-          <a:chOff y="0" x="0"/>
-          <a:chExt cy="0" cx="0"/>
+          <a:off x="0" y="0"/>
+          <a:ext cx="0" cy="0"/>
+          <a:chOff x="0" y="0"/>
+          <a:chExt cx="0" cy="0"/>
         </a:xfrm>
       </p:grpSpPr>
       <p:sp>
         <p:nvSpPr>
           <p:cNvPr id="10" name="Shape 10"/>
-          <p:cNvSpPr txBox="1"/>
+          <p:cNvSpPr txBox="1">
+            <a:spLocks noGrp="1"/>
+          </p:cNvSpPr>
           <p:nvPr>
             <p:ph type="title"/>
           </p:nvPr>
         </p:nvSpPr>
         <p:spPr>
           <a:xfrm>
-            <a:off y="304800" x="304800"/>
-            <a:ext cy="914400" cx="9550400"/>
+            <a:off x="304800" y="304800"/>
+            <a:ext cx="9550400" cy="914400"/>
           </a:xfrm>
           <a:prstGeom prst="rect">
             <a:avLst/>
@@ -751,7 +880,7 @@
           </a:ln>
         </p:spPr>
         <p:txBody>
-          <a:bodyPr bIns="91425" rIns="91425" lIns="91425" tIns="91425" anchor="t" anchorCtr="0"/>
+          <a:bodyPr lIns="91425" tIns="91425" rIns="91425" bIns="91425" anchor="t" anchorCtr="0"/>
           <a:lstStyle>
             <a:lvl1pPr>
               <a:spcBef>
@@ -817,21 +946,25 @@
               <a:defRPr sz="4266"/>
             </a:lvl9pPr>
           </a:lstStyle>
-          <a:p/>
+          <a:p>
+            <a:endParaRPr/>
+          </a:p>
         </p:txBody>
       </p:sp>
       <p:sp>
         <p:nvSpPr>
           <p:cNvPr id="11" name="Shape 11"/>
-          <p:cNvSpPr txBox="1"/>
+          <p:cNvSpPr txBox="1">
+            <a:spLocks noGrp="1"/>
+          </p:cNvSpPr>
           <p:nvPr>
-            <p:ph idx="1" type="body"/>
+            <p:ph type="body" idx="1"/>
           </p:nvPr>
         </p:nvSpPr>
         <p:spPr>
           <a:xfrm>
-            <a:off y="1828800" x="304800"/>
-            <a:ext cy="5486399" cx="9550400"/>
+            <a:off x="304800" y="1828800"/>
+            <a:ext cx="9550400" cy="5486399"/>
           </a:xfrm>
           <a:prstGeom prst="rect">
             <a:avLst/>
@@ -842,7 +975,7 @@
           </a:ln>
         </p:spPr>
         <p:txBody>
-          <a:bodyPr bIns="91425" rIns="91425" lIns="91425" tIns="91425" anchor="t" anchorCtr="0"/>
+          <a:bodyPr lIns="91425" tIns="91425" rIns="91425" bIns="91425" anchor="t" anchorCtr="0"/>
           <a:lstStyle>
             <a:lvl1pPr>
               <a:spcBef>
@@ -908,7 +1041,9 @@
               <a:defRPr sz="2666"/>
             </a:lvl9pPr>
           </a:lstStyle>
-          <a:p/>
+          <a:p>
+            <a:endParaRPr/>
+          </a:p>
         </p:txBody>
       </p:sp>
     </p:spTree>
@@ -920,34 +1055,36 @@
 </file>
 
 <file path=ppt/slideLayouts/slideLayout4.xml><?xml version="1.0" encoding="utf-8"?>
-<p:sldLayout xmlns:a="http://schemas.openxmlformats.org/drawingml/2006/main" xmlns:r="http://schemas.openxmlformats.org/officeDocument/2006/relationships" xmlns:mc="http://schemas.openxmlformats.org/markup-compatibility/2006" xmlns:mv="urn:schemas-microsoft-com:mac:vml" xmlns:p="http://schemas.openxmlformats.org/presentationml/2006/main" xmlns:c="http://schemas.openxmlformats.org/drawingml/2006/chart" xmlns:dgm="http://schemas.openxmlformats.org/drawingml/2006/diagram" xmlns:o="urn:schemas-microsoft-com:office:office" xmlns:v="urn:schemas-microsoft-com:vml" xmlns:pvml="urn:schemas-microsoft-com:office:powerpoint" xmlns:com="http://schemas.openxmlformats.org/drawingml/2006/compatibility" xmlns:p14="http://schemas.microsoft.com/office/powerpoint/2010/main" type="twoColTx">
+<p:sldLayout xmlns:a="http://schemas.openxmlformats.org/drawingml/2006/main" xmlns:r="http://schemas.openxmlformats.org/officeDocument/2006/relationships" xmlns:p="http://schemas.openxmlformats.org/presentationml/2006/main" type="twoColTx">
   <p:cSld name="Title and Two Columns">
     <p:spTree>
       <p:nvGrpSpPr>
-        <p:cNvPr id="12" name="Shape 12"/>
+        <p:cNvPr id="1" name="Shape 12"/>
         <p:cNvGrpSpPr/>
         <p:nvPr/>
       </p:nvGrpSpPr>
       <p:grpSpPr>
         <a:xfrm>
-          <a:off y="0" x="0"/>
-          <a:ext cy="0" cx="0"/>
-          <a:chOff y="0" x="0"/>
-          <a:chExt cy="0" cx="0"/>
+          <a:off x="0" y="0"/>
+          <a:ext cx="0" cy="0"/>
+          <a:chOff x="0" y="0"/>
+          <a:chExt cx="0" cy="0"/>
         </a:xfrm>
       </p:grpSpPr>
       <p:sp>
         <p:nvSpPr>
           <p:cNvPr id="13" name="Shape 13"/>
-          <p:cNvSpPr txBox="1"/>
+          <p:cNvSpPr txBox="1">
+            <a:spLocks noGrp="1"/>
+          </p:cNvSpPr>
           <p:nvPr>
             <p:ph type="title"/>
           </p:nvPr>
         </p:nvSpPr>
         <p:spPr>
           <a:xfrm>
-            <a:off y="304800" x="304800"/>
-            <a:ext cy="914400" cx="9550400"/>
+            <a:off x="304800" y="304800"/>
+            <a:ext cx="9550400" cy="914400"/>
           </a:xfrm>
           <a:prstGeom prst="rect">
             <a:avLst/>
@@ -958,7 +1095,7 @@
           </a:ln>
         </p:spPr>
         <p:txBody>
-          <a:bodyPr bIns="91425" rIns="91425" lIns="91425" tIns="91425" anchor="t" anchorCtr="0"/>
+          <a:bodyPr lIns="91425" tIns="91425" rIns="91425" bIns="91425" anchor="t" anchorCtr="0"/>
           <a:lstStyle>
             <a:lvl1pPr>
               <a:spcBef>
@@ -1024,21 +1161,25 @@
               <a:defRPr sz="4266"/>
             </a:lvl9pPr>
           </a:lstStyle>
-          <a:p/>
+          <a:p>
+            <a:endParaRPr/>
+          </a:p>
         </p:txBody>
       </p:sp>
       <p:sp>
         <p:nvSpPr>
           <p:cNvPr id="14" name="Shape 14"/>
-          <p:cNvSpPr txBox="1"/>
+          <p:cNvSpPr txBox="1">
+            <a:spLocks noGrp="1"/>
+          </p:cNvSpPr>
           <p:nvPr>
-            <p:ph idx="1" type="body"/>
+            <p:ph type="body" idx="1"/>
           </p:nvPr>
         </p:nvSpPr>
         <p:spPr>
           <a:xfrm>
-            <a:off y="1828800" x="304800"/>
-            <a:ext cy="5486399" cx="4470399"/>
+            <a:off x="304800" y="1828800"/>
+            <a:ext cx="4470399" cy="5486399"/>
           </a:xfrm>
           <a:prstGeom prst="rect">
             <a:avLst/>
@@ -1049,7 +1190,7 @@
           </a:ln>
         </p:spPr>
         <p:txBody>
-          <a:bodyPr bIns="91425" rIns="91425" lIns="91425" tIns="91425" anchor="t" anchorCtr="0"/>
+          <a:bodyPr lIns="91425" tIns="91425" rIns="91425" bIns="91425" anchor="t" anchorCtr="0"/>
           <a:lstStyle>
             <a:lvl1pPr>
               <a:spcBef>
@@ -1115,21 +1256,25 @@
               <a:defRPr sz="2666"/>
             </a:lvl9pPr>
           </a:lstStyle>
-          <a:p/>
+          <a:p>
+            <a:endParaRPr/>
+          </a:p>
         </p:txBody>
       </p:sp>
       <p:sp>
         <p:nvSpPr>
           <p:cNvPr id="15" name="Shape 15"/>
-          <p:cNvSpPr txBox="1"/>
+          <p:cNvSpPr txBox="1">
+            <a:spLocks noGrp="1"/>
+          </p:cNvSpPr>
           <p:nvPr>
-            <p:ph idx="2" type="body"/>
+            <p:ph type="body" idx="2"/>
           </p:nvPr>
         </p:nvSpPr>
         <p:spPr>
           <a:xfrm>
-            <a:off y="1828800" x="5384800"/>
-            <a:ext cy="5486399" cx="4470399"/>
+            <a:off x="5384800" y="1828800"/>
+            <a:ext cx="4470399" cy="5486399"/>
           </a:xfrm>
           <a:prstGeom prst="rect">
             <a:avLst/>
@@ -1140,7 +1285,7 @@
           </a:ln>
         </p:spPr>
         <p:txBody>
-          <a:bodyPr bIns="91425" rIns="91425" lIns="91425" tIns="91425" anchor="t" anchorCtr="0"/>
+          <a:bodyPr lIns="91425" tIns="91425" rIns="91425" bIns="91425" anchor="t" anchorCtr="0"/>
           <a:lstStyle>
             <a:lvl1pPr>
               <a:spcBef>
@@ -1206,7 +1351,9 @@
               <a:defRPr sz="2666"/>
             </a:lvl9pPr>
           </a:lstStyle>
-          <a:p/>
+          <a:p>
+            <a:endParaRPr/>
+          </a:p>
         </p:txBody>
       </p:sp>
     </p:spTree>
@@ -1218,34 +1365,36 @@
 </file>
 
 <file path=ppt/slideLayouts/slideLayout5.xml><?xml version="1.0" encoding="utf-8"?>
-<p:sldLayout xmlns:a="http://schemas.openxmlformats.org/drawingml/2006/main" xmlns:r="http://schemas.openxmlformats.org/officeDocument/2006/relationships" xmlns:mc="http://schemas.openxmlformats.org/markup-compatibility/2006" xmlns:mv="urn:schemas-microsoft-com:mac:vml" xmlns:p="http://schemas.openxmlformats.org/presentationml/2006/main" xmlns:c="http://schemas.openxmlformats.org/drawingml/2006/chart" xmlns:dgm="http://schemas.openxmlformats.org/drawingml/2006/diagram" xmlns:o="urn:schemas-microsoft-com:office:office" xmlns:v="urn:schemas-microsoft-com:vml" xmlns:pvml="urn:schemas-microsoft-com:office:powerpoint" xmlns:com="http://schemas.openxmlformats.org/drawingml/2006/compatibility" xmlns:p14="http://schemas.microsoft.com/office/powerpoint/2010/main">
+<p:sldLayout xmlns:a="http://schemas.openxmlformats.org/drawingml/2006/main" xmlns:r="http://schemas.openxmlformats.org/officeDocument/2006/relationships" xmlns:p="http://schemas.openxmlformats.org/presentationml/2006/main">
   <p:cSld name="Caption">
     <p:spTree>
       <p:nvGrpSpPr>
-        <p:cNvPr id="16" name="Shape 16"/>
+        <p:cNvPr id="1" name="Shape 16"/>
         <p:cNvGrpSpPr/>
         <p:nvPr/>
       </p:nvGrpSpPr>
       <p:grpSpPr>
         <a:xfrm>
-          <a:off y="0" x="0"/>
-          <a:ext cy="0" cx="0"/>
-          <a:chOff y="0" x="0"/>
-          <a:chExt cy="0" cx="0"/>
+          <a:off x="0" y="0"/>
+          <a:ext cx="0" cy="0"/>
+          <a:chOff x="0" y="0"/>
+          <a:chExt cx="0" cy="0"/>
         </a:xfrm>
       </p:grpSpPr>
       <p:sp>
         <p:nvSpPr>
           <p:cNvPr id="17" name="Shape 17"/>
-          <p:cNvSpPr txBox="1"/>
+          <p:cNvSpPr txBox="1">
+            <a:spLocks noGrp="1"/>
+          </p:cNvSpPr>
           <p:nvPr>
-            <p:ph idx="1" type="body"/>
+            <p:ph type="body" idx="1"/>
           </p:nvPr>
         </p:nvSpPr>
         <p:spPr>
           <a:xfrm>
-            <a:off y="6705600" x="304800"/>
-            <a:ext cy="609599" cx="9550400"/>
+            <a:off x="304800" y="6705600"/>
+            <a:ext cx="9550400" cy="609599"/>
           </a:xfrm>
           <a:prstGeom prst="rect">
             <a:avLst/>
@@ -1256,7 +1405,7 @@
           </a:ln>
         </p:spPr>
         <p:txBody>
-          <a:bodyPr bIns="91425" rIns="91425" lIns="91425" tIns="91425" anchor="t" anchorCtr="0"/>
+          <a:bodyPr lIns="91425" tIns="91425" rIns="91425" bIns="91425" anchor="t" anchorCtr="0"/>
           <a:lstStyle>
             <a:lvl1pPr algn="ctr">
               <a:spcBef>
@@ -1322,7 +1471,9 @@
               <a:defRPr sz="3200"/>
             </a:lvl9pPr>
           </a:lstStyle>
-          <a:p/>
+          <a:p>
+            <a:endParaRPr/>
+          </a:p>
         </p:txBody>
       </p:sp>
     </p:spTree>
@@ -1334,32 +1485,33 @@
 </file>
 
 <file path=ppt/slideMasters/slideMaster1.xml><?xml version="1.0" encoding="utf-8"?>
-<p:sldMaster xmlns:a="http://schemas.openxmlformats.org/drawingml/2006/main" xmlns:r="http://schemas.openxmlformats.org/officeDocument/2006/relationships" xmlns:mc="http://schemas.openxmlformats.org/markup-compatibility/2006" xmlns:mv="urn:schemas-microsoft-com:mac:vml" xmlns:p="http://schemas.openxmlformats.org/presentationml/2006/main" xmlns:c="http://schemas.openxmlformats.org/drawingml/2006/chart" xmlns:dgm="http://schemas.openxmlformats.org/drawingml/2006/diagram" xmlns:o="urn:schemas-microsoft-com:office:office" xmlns:v="urn:schemas-microsoft-com:vml" xmlns:pvml="urn:schemas-microsoft-com:office:powerpoint" xmlns:com="http://schemas.openxmlformats.org/drawingml/2006/compatibility" xmlns:p14="http://schemas.microsoft.com/office/powerpoint/2010/main">
+<p:sldMaster xmlns:a="http://schemas.openxmlformats.org/drawingml/2006/main" xmlns:r="http://schemas.openxmlformats.org/officeDocument/2006/relationships" xmlns:p="http://schemas.openxmlformats.org/presentationml/2006/main">
   <p:cSld>
     <p:bg>
       <p:bgPr>
         <a:solidFill>
           <a:srgbClr val="FFFFFF"/>
         </a:solidFill>
+        <a:effectLst/>
       </p:bgPr>
     </p:bg>
     <p:spTree>
       <p:nvGrpSpPr>
-        <p:cNvPr id="4" name="Shape 4"/>
+        <p:cNvPr id="1" name="Shape 4"/>
         <p:cNvGrpSpPr/>
         <p:nvPr/>
       </p:nvGrpSpPr>
       <p:grpSpPr>
         <a:xfrm>
-          <a:off y="0" x="0"/>
-          <a:ext cy="0" cx="0"/>
-          <a:chOff y="0" x="0"/>
-          <a:chExt cy="0" cx="0"/>
+          <a:off x="0" y="0"/>
+          <a:ext cx="0" cy="0"/>
+          <a:chOff x="0" y="0"/>
+          <a:chExt cx="0" cy="0"/>
         </a:xfrm>
       </p:grpSpPr>
     </p:spTree>
   </p:cSld>
-  <p:clrMap accent2="accent2" accent3="accent3" accent4="accent4" accent5="accent5" accent6="accent6" hlink="hlink" tx2="lt2" tx1="dk1" bg2="dk2" bg1="lt1" folHlink="folHlink" accent1="accent1"/>
+  <p:clrMap bg1="lt1" tx1="dk1" bg2="dk2" tx2="lt2" accent1="accent1" accent2="accent2" accent3="accent3" accent4="accent4" accent5="accent5" accent6="accent6" hlink="hlink" folHlink="folHlink"/>
   <p:sldLayoutIdLst>
     <p:sldLayoutId id="2147483648" r:id="rId1"/>
     <p:sldLayoutId id="2147483649" r:id="rId2"/>
@@ -1369,7 +1521,7 @@
   </p:sldLayoutIdLst>
   <p:txStyles>
     <p:titleStyle>
-      <a:defPPr algn="l" rtl="0" marR="0">
+      <a:defPPr marR="0" algn="l" rtl="0">
         <a:lnSpc>
           <a:spcPct val="100000"/>
         </a:lnSpc>
@@ -1380,7 +1532,7 @@
           <a:spcPts val="0"/>
         </a:spcAft>
       </a:defPPr>
-      <a:lvl1pPr algn="l" rtl="0" marR="0">
+      <a:lvl1pPr marR="0" algn="l" rtl="0">
         <a:lnSpc>
           <a:spcPct val="100000"/>
         </a:lnSpc>
@@ -1391,7 +1543,7 @@
           <a:spcPts val="0"/>
         </a:spcAft>
         <a:buNone/>
-        <a:defRPr strike="noStrike" u="none" b="0" cap="none" baseline="0" sz="1400" i="0">
+        <a:defRPr sz="1400" b="0" i="0" u="none" strike="noStrike" cap="none" baseline="0">
           <a:solidFill>
             <a:srgbClr val="000000"/>
           </a:solidFill>
@@ -1402,7 +1554,7 @@
           <a:rtl val="0"/>
         </a:defRPr>
       </a:lvl1pPr>
-      <a:lvl2pPr algn="l" rtl="0" marR="0">
+      <a:lvl2pPr marR="0" algn="l" rtl="0">
         <a:lnSpc>
           <a:spcPct val="100000"/>
         </a:lnSpc>
@@ -1413,7 +1565,7 @@
           <a:spcPts val="0"/>
         </a:spcAft>
         <a:buNone/>
-        <a:defRPr strike="noStrike" u="none" b="0" cap="none" baseline="0" sz="1400" i="0">
+        <a:defRPr sz="1400" b="0" i="0" u="none" strike="noStrike" cap="none" baseline="0">
           <a:solidFill>
             <a:srgbClr val="000000"/>
           </a:solidFill>
@@ -1426,7 +1578,7 @@
       </a:lvl2pPr>
     </p:titleStyle>
     <p:bodyStyle>
-      <a:defPPr algn="l" rtl="0" marR="0">
+      <a:defPPr marR="0" algn="l" rtl="0">
         <a:lnSpc>
           <a:spcPct val="100000"/>
         </a:lnSpc>
@@ -1437,7 +1589,7 @@
           <a:spcPts val="0"/>
         </a:spcAft>
       </a:defPPr>
-      <a:lvl1pPr algn="l" rtl="0" marR="0">
+      <a:lvl1pPr marR="0" algn="l" rtl="0">
         <a:lnSpc>
           <a:spcPct val="100000"/>
         </a:lnSpc>
@@ -1448,7 +1600,7 @@
           <a:spcPts val="0"/>
         </a:spcAft>
         <a:buNone/>
-        <a:defRPr strike="noStrike" u="none" b="0" cap="none" baseline="0" sz="1400" i="0">
+        <a:defRPr sz="1400" b="0" i="0" u="none" strike="noStrike" cap="none" baseline="0">
           <a:solidFill>
             <a:srgbClr val="000000"/>
           </a:solidFill>
@@ -1459,7 +1611,7 @@
           <a:rtl val="0"/>
         </a:defRPr>
       </a:lvl1pPr>
-      <a:lvl2pPr algn="l" rtl="0" marR="0">
+      <a:lvl2pPr marR="0" algn="l" rtl="0">
         <a:lnSpc>
           <a:spcPct val="100000"/>
         </a:lnSpc>
@@ -1470,7 +1622,7 @@
           <a:spcPts val="0"/>
         </a:spcAft>
         <a:buNone/>
-        <a:defRPr strike="noStrike" u="none" b="0" cap="none" baseline="0" sz="1400" i="0">
+        <a:defRPr sz="1400" b="0" i="0" u="none" strike="noStrike" cap="none" baseline="0">
           <a:solidFill>
             <a:srgbClr val="000000"/>
           </a:solidFill>
@@ -1481,7 +1633,7 @@
           <a:rtl val="0"/>
         </a:defRPr>
       </a:lvl2pPr>
-      <a:lvl3pPr algn="l" rtl="0" marR="0">
+      <a:lvl3pPr marR="0" algn="l" rtl="0">
         <a:lnSpc>
           <a:spcPct val="100000"/>
         </a:lnSpc>
@@ -1492,7 +1644,7 @@
           <a:spcPts val="0"/>
         </a:spcAft>
         <a:buNone/>
-        <a:defRPr strike="noStrike" u="none" b="0" cap="none" baseline="0" sz="1400" i="0">
+        <a:defRPr sz="1400" b="0" i="0" u="none" strike="noStrike" cap="none" baseline="0">
           <a:solidFill>
             <a:srgbClr val="000000"/>
           </a:solidFill>
@@ -1503,7 +1655,7 @@
           <a:rtl val="0"/>
         </a:defRPr>
       </a:lvl3pPr>
-      <a:lvl4pPr algn="l" rtl="0" marR="0">
+      <a:lvl4pPr marR="0" algn="l" rtl="0">
         <a:lnSpc>
           <a:spcPct val="100000"/>
         </a:lnSpc>
@@ -1514,7 +1666,7 @@
           <a:spcPts val="0"/>
         </a:spcAft>
         <a:buNone/>
-        <a:defRPr strike="noStrike" u="none" b="0" cap="none" baseline="0" sz="1400" i="0">
+        <a:defRPr sz="1400" b="0" i="0" u="none" strike="noStrike" cap="none" baseline="0">
           <a:solidFill>
             <a:srgbClr val="000000"/>
           </a:solidFill>
@@ -1525,7 +1677,7 @@
           <a:rtl val="0"/>
         </a:defRPr>
       </a:lvl4pPr>
-      <a:lvl5pPr algn="l" rtl="0" marR="0">
+      <a:lvl5pPr marR="0" algn="l" rtl="0">
         <a:lnSpc>
           <a:spcPct val="100000"/>
         </a:lnSpc>
@@ -1536,7 +1688,7 @@
           <a:spcPts val="0"/>
         </a:spcAft>
         <a:buNone/>
-        <a:defRPr strike="noStrike" u="none" b="0" cap="none" baseline="0" sz="1400" i="0">
+        <a:defRPr sz="1400" b="0" i="0" u="none" strike="noStrike" cap="none" baseline="0">
           <a:solidFill>
             <a:srgbClr val="000000"/>
           </a:solidFill>
@@ -1547,7 +1699,7 @@
           <a:rtl val="0"/>
         </a:defRPr>
       </a:lvl5pPr>
-      <a:lvl6pPr algn="l" rtl="0" marR="0">
+      <a:lvl6pPr marR="0" algn="l" rtl="0">
         <a:lnSpc>
           <a:spcPct val="100000"/>
         </a:lnSpc>
@@ -1558,7 +1710,7 @@
           <a:spcPts val="0"/>
         </a:spcAft>
         <a:buNone/>
-        <a:defRPr strike="noStrike" u="none" b="0" cap="none" baseline="0" sz="1400" i="0">
+        <a:defRPr sz="1400" b="0" i="0" u="none" strike="noStrike" cap="none" baseline="0">
           <a:solidFill>
             <a:srgbClr val="000000"/>
           </a:solidFill>
@@ -1569,7 +1721,7 @@
           <a:rtl val="0"/>
         </a:defRPr>
       </a:lvl6pPr>
-      <a:lvl7pPr algn="l" rtl="0" marR="0">
+      <a:lvl7pPr marR="0" algn="l" rtl="0">
         <a:lnSpc>
           <a:spcPct val="100000"/>
         </a:lnSpc>
@@ -1580,7 +1732,7 @@
           <a:spcPts val="0"/>
         </a:spcAft>
         <a:buNone/>
-        <a:defRPr strike="noStrike" u="none" b="0" cap="none" baseline="0" sz="1400" i="0">
+        <a:defRPr sz="1400" b="0" i="0" u="none" strike="noStrike" cap="none" baseline="0">
           <a:solidFill>
             <a:srgbClr val="000000"/>
           </a:solidFill>
@@ -1591,7 +1743,7 @@
           <a:rtl val="0"/>
         </a:defRPr>
       </a:lvl7pPr>
-      <a:lvl8pPr algn="l" rtl="0" marR="0">
+      <a:lvl8pPr marR="0" algn="l" rtl="0">
         <a:lnSpc>
           <a:spcPct val="100000"/>
         </a:lnSpc>
@@ -1602,7 +1754,7 @@
           <a:spcPts val="0"/>
         </a:spcAft>
         <a:buNone/>
-        <a:defRPr strike="noStrike" u="none" b="0" cap="none" baseline="0" sz="1400" i="0">
+        <a:defRPr sz="1400" b="0" i="0" u="none" strike="noStrike" cap="none" baseline="0">
           <a:solidFill>
             <a:srgbClr val="000000"/>
           </a:solidFill>
@@ -1613,7 +1765,7 @@
           <a:rtl val="0"/>
         </a:defRPr>
       </a:lvl8pPr>
-      <a:lvl9pPr algn="l" rtl="0" marR="0">
+      <a:lvl9pPr marR="0" algn="l" rtl="0">
         <a:lnSpc>
           <a:spcPct val="100000"/>
         </a:lnSpc>
@@ -1624,7 +1776,7 @@
           <a:spcPts val="0"/>
         </a:spcAft>
         <a:buNone/>
-        <a:defRPr strike="noStrike" u="none" b="0" cap="none" baseline="0" sz="1400" i="0">
+        <a:defRPr sz="1400" b="0" i="0" u="none" strike="noStrike" cap="none" baseline="0">
           <a:solidFill>
             <a:srgbClr val="000000"/>
           </a:solidFill>
@@ -1637,7 +1789,7 @@
       </a:lvl9pPr>
     </p:bodyStyle>
     <p:otherStyle>
-      <a:defPPr algn="l" rtl="0" marR="0">
+      <a:defPPr marR="0" algn="l" rtl="0">
         <a:lnSpc>
           <a:spcPct val="100000"/>
         </a:lnSpc>
@@ -1648,7 +1800,7 @@
           <a:spcPts val="0"/>
         </a:spcAft>
       </a:defPPr>
-      <a:lvl1pPr algn="l" rtl="0" marR="0">
+      <a:lvl1pPr marR="0" algn="l" rtl="0">
         <a:lnSpc>
           <a:spcPct val="100000"/>
         </a:lnSpc>
@@ -1659,7 +1811,7 @@
           <a:spcPts val="0"/>
         </a:spcAft>
         <a:buNone/>
-        <a:defRPr strike="noStrike" u="none" b="0" cap="none" baseline="0" sz="1400" i="0">
+        <a:defRPr sz="1400" b="0" i="0" u="none" strike="noStrike" cap="none" baseline="0">
           <a:solidFill>
             <a:srgbClr val="000000"/>
           </a:solidFill>
@@ -1670,7 +1822,7 @@
           <a:rtl val="0"/>
         </a:defRPr>
       </a:lvl1pPr>
-      <a:lvl2pPr algn="l" rtl="0" marR="0">
+      <a:lvl2pPr marR="0" algn="l" rtl="0">
         <a:lnSpc>
           <a:spcPct val="100000"/>
         </a:lnSpc>
@@ -1681,7 +1833,7 @@
           <a:spcPts val="0"/>
         </a:spcAft>
         <a:buNone/>
-        <a:defRPr strike="noStrike" u="none" b="0" cap="none" baseline="0" sz="1400" i="0">
+        <a:defRPr sz="1400" b="0" i="0" u="none" strike="noStrike" cap="none" baseline="0">
           <a:solidFill>
             <a:srgbClr val="000000"/>
           </a:solidFill>
@@ -1692,7 +1844,7 @@
           <a:rtl val="0"/>
         </a:defRPr>
       </a:lvl2pPr>
-      <a:lvl3pPr algn="l" rtl="0" marR="0">
+      <a:lvl3pPr marR="0" algn="l" rtl="0">
         <a:lnSpc>
           <a:spcPct val="100000"/>
         </a:lnSpc>
@@ -1703,7 +1855,7 @@
           <a:spcPts val="0"/>
         </a:spcAft>
         <a:buNone/>
-        <a:defRPr strike="noStrike" u="none" b="0" cap="none" baseline="0" sz="1400" i="0">
+        <a:defRPr sz="1400" b="0" i="0" u="none" strike="noStrike" cap="none" baseline="0">
           <a:solidFill>
             <a:srgbClr val="000000"/>
           </a:solidFill>
@@ -1714,7 +1866,7 @@
           <a:rtl val="0"/>
         </a:defRPr>
       </a:lvl3pPr>
-      <a:lvl4pPr algn="l" rtl="0" marR="0">
+      <a:lvl4pPr marR="0" algn="l" rtl="0">
         <a:lnSpc>
           <a:spcPct val="100000"/>
         </a:lnSpc>
@@ -1725,7 +1877,7 @@
           <a:spcPts val="0"/>
         </a:spcAft>
         <a:buNone/>
-        <a:defRPr strike="noStrike" u="none" b="0" cap="none" baseline="0" sz="1400" i="0">
+        <a:defRPr sz="1400" b="0" i="0" u="none" strike="noStrike" cap="none" baseline="0">
           <a:solidFill>
             <a:srgbClr val="000000"/>
           </a:solidFill>
@@ -1736,7 +1888,7 @@
           <a:rtl val="0"/>
         </a:defRPr>
       </a:lvl4pPr>
-      <a:lvl5pPr algn="l" rtl="0" marR="0">
+      <a:lvl5pPr marR="0" algn="l" rtl="0">
         <a:lnSpc>
           <a:spcPct val="100000"/>
         </a:lnSpc>
@@ -1747,7 +1899,7 @@
           <a:spcPts val="0"/>
         </a:spcAft>
         <a:buNone/>
-        <a:defRPr strike="noStrike" u="none" b="0" cap="none" baseline="0" sz="1400" i="0">
+        <a:defRPr sz="1400" b="0" i="0" u="none" strike="noStrike" cap="none" baseline="0">
           <a:solidFill>
             <a:srgbClr val="000000"/>
           </a:solidFill>
@@ -1758,7 +1910,7 @@
           <a:rtl val="0"/>
         </a:defRPr>
       </a:lvl5pPr>
-      <a:lvl6pPr algn="l" rtl="0" marR="0">
+      <a:lvl6pPr marR="0" algn="l" rtl="0">
         <a:lnSpc>
           <a:spcPct val="100000"/>
         </a:lnSpc>
@@ -1769,7 +1921,7 @@
           <a:spcPts val="0"/>
         </a:spcAft>
         <a:buNone/>
-        <a:defRPr strike="noStrike" u="none" b="0" cap="none" baseline="0" sz="1400" i="0">
+        <a:defRPr sz="1400" b="0" i="0" u="none" strike="noStrike" cap="none" baseline="0">
           <a:solidFill>
             <a:srgbClr val="000000"/>
           </a:solidFill>
@@ -1780,7 +1932,7 @@
           <a:rtl val="0"/>
         </a:defRPr>
       </a:lvl6pPr>
-      <a:lvl7pPr algn="l" rtl="0" marR="0">
+      <a:lvl7pPr marR="0" algn="l" rtl="0">
         <a:lnSpc>
           <a:spcPct val="100000"/>
         </a:lnSpc>
@@ -1791,7 +1943,7 @@
           <a:spcPts val="0"/>
         </a:spcAft>
         <a:buNone/>
-        <a:defRPr strike="noStrike" u="none" b="0" cap="none" baseline="0" sz="1400" i="0">
+        <a:defRPr sz="1400" b="0" i="0" u="none" strike="noStrike" cap="none" baseline="0">
           <a:solidFill>
             <a:srgbClr val="000000"/>
           </a:solidFill>
@@ -1802,7 +1954,7 @@
           <a:rtl val="0"/>
         </a:defRPr>
       </a:lvl7pPr>
-      <a:lvl8pPr algn="l" rtl="0" marR="0">
+      <a:lvl8pPr marR="0" algn="l" rtl="0">
         <a:lnSpc>
           <a:spcPct val="100000"/>
         </a:lnSpc>
@@ -1813,7 +1965,7 @@
           <a:spcPts val="0"/>
         </a:spcAft>
         <a:buNone/>
-        <a:defRPr strike="noStrike" u="none" b="0" cap="none" baseline="0" sz="1400" i="0">
+        <a:defRPr sz="1400" b="0" i="0" u="none" strike="noStrike" cap="none" baseline="0">
           <a:solidFill>
             <a:srgbClr val="000000"/>
           </a:solidFill>
@@ -1824,7 +1976,7 @@
           <a:rtl val="0"/>
         </a:defRPr>
       </a:lvl8pPr>
-      <a:lvl9pPr algn="l" rtl="0" marR="0">
+      <a:lvl9pPr marR="0" algn="l" rtl="0">
         <a:lnSpc>
           <a:spcPct val="100000"/>
         </a:lnSpc>
@@ -1835,7 +1987,7 @@
           <a:spcPts val="0"/>
         </a:spcAft>
         <a:buNone/>
-        <a:defRPr strike="noStrike" u="none" b="0" cap="none" baseline="0" sz="1400" i="0">
+        <a:defRPr sz="1400" b="0" i="0" u="none" strike="noStrike" cap="none" baseline="0">
           <a:solidFill>
             <a:srgbClr val="000000"/>
           </a:solidFill>
@@ -1852,41 +2004,43 @@
 </file>
 
 <file path=ppt/slides/slide1.xml><?xml version="1.0" encoding="utf-8"?>
-<p:sld xmlns:a="http://schemas.openxmlformats.org/drawingml/2006/main" xmlns:r="http://schemas.openxmlformats.org/officeDocument/2006/relationships" xmlns:mc="http://schemas.openxmlformats.org/markup-compatibility/2006" xmlns:mv="urn:schemas-microsoft-com:mac:vml" xmlns:p="http://schemas.openxmlformats.org/presentationml/2006/main" xmlns:c="http://schemas.openxmlformats.org/drawingml/2006/chart" xmlns:dgm="http://schemas.openxmlformats.org/drawingml/2006/diagram" xmlns:o="urn:schemas-microsoft-com:office:office" xmlns:v="urn:schemas-microsoft-com:vml" xmlns:pvml="urn:schemas-microsoft-com:office:powerpoint" xmlns:com="http://schemas.openxmlformats.org/drawingml/2006/compatibility" xmlns:p14="http://schemas.microsoft.com/office/powerpoint/2010/main">
+<p:sld xmlns:a="http://schemas.openxmlformats.org/drawingml/2006/main" xmlns:r="http://schemas.openxmlformats.org/officeDocument/2006/relationships" xmlns:p="http://schemas.openxmlformats.org/presentationml/2006/main">
   <p:cSld>
     <p:spTree>
       <p:nvGrpSpPr>
-        <p:cNvPr id="18" name="Shape 18"/>
+        <p:cNvPr id="1" name="Shape 18"/>
         <p:cNvGrpSpPr/>
         <p:nvPr/>
       </p:nvGrpSpPr>
       <p:grpSpPr>
         <a:xfrm>
-          <a:off y="0" x="0"/>
-          <a:ext cy="0" cx="0"/>
-          <a:chOff y="0" x="0"/>
-          <a:chExt cy="0" cx="0"/>
+          <a:off x="0" y="0"/>
+          <a:ext cx="0" cy="0"/>
+          <a:chOff x="0" y="0"/>
+          <a:chExt cx="0" cy="0"/>
         </a:xfrm>
       </p:grpSpPr>
       <p:sp>
         <p:nvSpPr>
           <p:cNvPr id="19" name="Shape 19"/>
-          <p:cNvSpPr txBox="1"/>
+          <p:cNvSpPr txBox="1">
+            <a:spLocks noGrp="1"/>
+          </p:cNvSpPr>
           <p:nvPr>
             <p:ph type="title"/>
           </p:nvPr>
         </p:nvSpPr>
         <p:spPr>
           <a:xfrm>
-            <a:off y="304800" x="304800"/>
-            <a:ext cy="990599" cx="9626599"/>
+            <a:off x="304800" y="304800"/>
+            <a:ext cx="9626599" cy="990599"/>
           </a:xfrm>
           <a:prstGeom prst="rect">
             <a:avLst/>
           </a:prstGeom>
         </p:spPr>
         <p:txBody>
-          <a:bodyPr bIns="38100" rIns="38100" lIns="38100" tIns="38100" anchor="t" anchorCtr="0">
+          <a:bodyPr lIns="38100" tIns="38100" rIns="38100" bIns="38100" anchor="t" anchorCtr="0">
             <a:spAutoFit/>
           </a:bodyPr>
           <a:lstStyle/>
@@ -1905,7 +2059,7 @@
               <a:t>Android </a:t>
             </a:r>
             <a:r>
-              <a:rPr sz="4266" lang="en-US">
+              <a:rPr lang="en-US" sz="4266">
                 <a:solidFill>
                   <a:srgbClr val="000000"/>
                 </a:solidFill>
@@ -1922,27 +2076,29 @@
       <p:sp>
         <p:nvSpPr>
           <p:cNvPr id="20" name="Shape 20"/>
-          <p:cNvSpPr txBox="1"/>
+          <p:cNvSpPr txBox="1">
+            <a:spLocks noGrp="1"/>
+          </p:cNvSpPr>
           <p:nvPr>
-            <p:ph idx="1" type="body"/>
+            <p:ph type="body" idx="1"/>
           </p:nvPr>
         </p:nvSpPr>
         <p:spPr>
           <a:xfrm>
-            <a:off y="1524000" x="304800"/>
-            <a:ext cy="5944175" cx="9624750"/>
+            <a:off x="304800" y="1524000"/>
+            <a:ext cx="9624750" cy="6201697"/>
           </a:xfrm>
           <a:prstGeom prst="rect">
             <a:avLst/>
           </a:prstGeom>
         </p:spPr>
         <p:txBody>
-          <a:bodyPr bIns="38100" rIns="38100" lIns="38100" tIns="38100" anchor="t" anchorCtr="0">
+          <a:bodyPr lIns="38100" tIns="38100" rIns="38100" bIns="38100" anchor="t" anchorCtr="0">
             <a:spAutoFit/>
           </a:bodyPr>
           <a:lstStyle/>
           <a:p>
-            <a:pPr rtl="0" lvl="0" marR="0" indent="-203200" marL="381000">
+            <a:pPr marL="381000" marR="0" lvl="0" indent="-203200" rtl="0">
               <a:lnSpc>
                 <a:spcPct val="100000"/>
               </a:lnSpc>
@@ -1960,12 +2116,12 @@
               <a:buChar char="●"/>
             </a:pPr>
             <a:r>
-              <a:rPr sz="2400" lang="en-US"/>
+              <a:rPr lang="en-US" sz="2400" dirty="0"/>
               <a:t>This site features a list of various Android tutorials.</a:t>
             </a:r>
           </a:p>
           <a:p>
-            <a:pPr rtl="0" lvl="0" marR="0" indent="-203200" marL="381000">
+            <a:pPr marL="381000" marR="0" lvl="0" indent="-203200" rtl="0">
               <a:lnSpc>
                 <a:spcPct val="100000"/>
               </a:lnSpc>
@@ -1983,12 +2139,12 @@
               <a:buChar char="●"/>
             </a:pPr>
             <a:r>
-              <a:rPr sz="2400" lang="en-US"/>
+              <a:rPr lang="en-US" sz="2400" dirty="0"/>
               <a:t>The complete source code for the tutorial can be downloaded by clicking on the download link </a:t>
             </a:r>
           </a:p>
           <a:p>
-            <a:pPr rtl="0" lvl="0" marR="0" indent="-203200" marL="381000">
+            <a:pPr marL="381000" marR="0" lvl="0" indent="-203200" rtl="0">
               <a:lnSpc>
                 <a:spcPct val="100000"/>
               </a:lnSpc>
@@ -2006,12 +2162,12 @@
               <a:buChar char="●"/>
             </a:pPr>
             <a:r>
-              <a:rPr sz="2400" lang="en-US"/>
+              <a:rPr lang="en-US" sz="2400" dirty="0"/>
               <a:t>All available tutorials are listed in the navigation bar to the left.</a:t>
             </a:r>
           </a:p>
           <a:p>
-            <a:pPr rtl="0" lvl="0" marR="0" indent="-203200" marL="381000">
+            <a:pPr marL="381000" marR="0" lvl="0" indent="-203200" rtl="0">
               <a:lnSpc>
                 <a:spcPct val="100000"/>
               </a:lnSpc>
@@ -2029,12 +2185,12 @@
               <a:buChar char="●"/>
             </a:pPr>
             <a:r>
-              <a:rPr sz="2400" lang="en-US"/>
+              <a:rPr lang="en-US" sz="2400" dirty="0"/>
               <a:t>Click on a specific tutorial to see further details.</a:t>
             </a:r>
           </a:p>
           <a:p>
-            <a:pPr rtl="0" lvl="0" marR="0" indent="-203200" marL="381000">
+            <a:pPr marL="381000" marR="0" lvl="0" indent="-203200" rtl="0">
               <a:lnSpc>
                 <a:spcPct val="100000"/>
               </a:lnSpc>
@@ -2052,12 +2208,12 @@
               <a:buChar char="●"/>
             </a:pPr>
             <a:r>
-              <a:rPr sz="2400" lang="en-US"/>
+              <a:rPr lang="en-US" sz="2400" dirty="0"/>
               <a:t>For each tutorial, there are a number of slides that explain some basics for the respective tutorial as well as the documented source code.</a:t>
             </a:r>
           </a:p>
           <a:p>
-            <a:pPr rtl="0" lvl="0" marR="0" indent="-203200" marL="381000">
+            <a:pPr marL="381000" marR="0" lvl="0" indent="-203200" rtl="0">
               <a:lnSpc>
                 <a:spcPct val="100000"/>
               </a:lnSpc>
@@ -2075,12 +2231,12 @@
               <a:buChar char="●"/>
             </a:pPr>
             <a:r>
-              <a:rPr sz="2400" lang="en-US"/>
+              <a:rPr lang="en-US" sz="2400" dirty="0"/>
               <a:t>Switch between the slides and the source code view using the tabs on the top.</a:t>
             </a:r>
           </a:p>
           <a:p>
-            <a:pPr rtl="0" lvl="0" marR="0" indent="-203200" marL="381000">
+            <a:pPr marL="381000" marR="0" lvl="0" indent="-203200" rtl="0">
               <a:lnSpc>
                 <a:spcPct val="100000"/>
               </a:lnSpc>
@@ -2098,12 +2254,12 @@
               <a:buChar char="●"/>
             </a:pPr>
             <a:r>
-              <a:rPr sz="2400" lang="en-US"/>
+              <a:rPr lang="en-US" sz="2400" dirty="0"/>
               <a:t>The first slide for each tutorial shows the directory path to the source code in the top right corner.</a:t>
             </a:r>
           </a:p>
           <a:p>
-            <a:pPr rtl="0" lvl="0" marR="0" indent="-203200" marL="381000">
+            <a:pPr marL="381000" marR="0" lvl="0" indent="-203200" rtl="0">
               <a:lnSpc>
                 <a:spcPct val="100000"/>
               </a:lnSpc>
@@ -2121,11 +2277,19 @@
               <a:buChar char="●"/>
             </a:pPr>
             <a:r>
-              <a:rPr sz="2400" lang="en-US"/>
-              <a:t>A tutorial can be imported in Eclipse </a:t>
+              <a:rPr lang="en-US" sz="2400" dirty="0" smtClean="0"/>
+              <a:t>Use Android Studio to open a </a:t>
             </a:r>
             <a:r>
-              <a:rPr sz="2400" lang="en-US">
+              <a:rPr lang="en-US" sz="2400" dirty="0"/>
+              <a:t>tutorial </a:t>
+            </a:r>
+            <a:r>
+              <a:rPr lang="en-US" sz="2400" dirty="0" smtClean="0"/>
+              <a:t>via </a:t>
+            </a:r>
+            <a:r>
+              <a:rPr lang="en-US" sz="2400" dirty="0" smtClean="0">
                 <a:solidFill>
                   <a:srgbClr val="000000"/>
                 </a:solidFill>
@@ -2134,8 +2298,114 @@
                 <a:cs typeface="Arial"/>
                 <a:sym typeface="Arial"/>
               </a:rPr>
-              <a:t>via File &gt; Import... &gt; Existing Projects into Workspace &gt; Select root directory.</a:t>
+              <a:t>File </a:t>
             </a:r>
+            <a:r>
+              <a:rPr lang="en-US" sz="2400" dirty="0">
+                <a:solidFill>
+                  <a:srgbClr val="000000"/>
+                </a:solidFill>
+                <a:latin typeface="Arial"/>
+                <a:ea typeface="Arial"/>
+                <a:cs typeface="Arial"/>
+                <a:sym typeface="Arial"/>
+              </a:rPr>
+              <a:t>&gt; </a:t>
+            </a:r>
+            <a:r>
+              <a:rPr lang="en-US" sz="2400" dirty="0" smtClean="0">
+                <a:solidFill>
+                  <a:srgbClr val="000000"/>
+                </a:solidFill>
+                <a:latin typeface="Arial"/>
+                <a:ea typeface="Arial"/>
+                <a:cs typeface="Arial"/>
+                <a:sym typeface="Arial"/>
+              </a:rPr>
+              <a:t>Open…&gt; </a:t>
+            </a:r>
+            <a:r>
+              <a:rPr lang="en-US" sz="2400" dirty="0">
+                <a:solidFill>
+                  <a:srgbClr val="000000"/>
+                </a:solidFill>
+                <a:latin typeface="Arial"/>
+                <a:ea typeface="Arial"/>
+                <a:cs typeface="Arial"/>
+                <a:sym typeface="Arial"/>
+              </a:rPr>
+              <a:t>Select root directory</a:t>
+            </a:r>
+            <a:r>
+              <a:rPr lang="en-US" sz="2400" dirty="0" smtClean="0">
+                <a:solidFill>
+                  <a:srgbClr val="000000"/>
+                </a:solidFill>
+                <a:latin typeface="Arial"/>
+                <a:ea typeface="Arial"/>
+                <a:cs typeface="Arial"/>
+                <a:sym typeface="Arial"/>
+              </a:rPr>
+              <a:t>.</a:t>
+            </a:r>
+          </a:p>
+          <a:p>
+            <a:pPr marL="381000" lvl="0" indent="-203200">
+              <a:buClr>
+                <a:srgbClr val="000000"/>
+              </a:buClr>
+              <a:buSzPct val="100000"/>
+              <a:buFont typeface="Arial"/>
+              <a:buChar char="●"/>
+            </a:pPr>
+            <a:r>
+              <a:rPr lang="en-US" sz="2400" dirty="0" smtClean="0"/>
+              <a:t>Fork on </a:t>
+            </a:r>
+            <a:r>
+              <a:rPr lang="en-US" sz="2400" dirty="0" err="1" smtClean="0"/>
+              <a:t>Github</a:t>
+            </a:r>
+            <a:r>
+              <a:rPr lang="en-US" sz="2400" dirty="0"/>
+              <a:t>: </a:t>
+            </a:r>
+            <a:r>
+              <a:rPr lang="en-US" sz="2400" dirty="0">
+                <a:hlinkClick r:id="rId3"/>
+              </a:rPr>
+              <a:t>https://github.com/apuder/android-</a:t>
+            </a:r>
+            <a:r>
+              <a:rPr lang="en-US" sz="2400" dirty="0" smtClean="0">
+                <a:hlinkClick r:id="rId3"/>
+              </a:rPr>
+              <a:t>tutorials</a:t>
+            </a:r>
+            <a:r>
+              <a:rPr lang="en-US" sz="2400" dirty="0" smtClean="0"/>
+              <a:t> </a:t>
+            </a:r>
+            <a:br>
+              <a:rPr lang="en-US" sz="2400" dirty="0" smtClean="0"/>
+            </a:br>
+            <a:r>
+              <a:rPr lang="en-US" sz="1200" i="1" dirty="0" smtClean="0"/>
+              <a:t>Note: unfortunately the PDF viewer used for this site does not support hyperlinks (yet). Download the PDF via</a:t>
+            </a:r>
+            <a:br>
+              <a:rPr lang="en-US" sz="1200" i="1" dirty="0" smtClean="0"/>
+            </a:br>
+            <a:r>
+              <a:rPr lang="en-US" sz="1200" i="1" dirty="0" smtClean="0"/>
+              <a:t>the download link in the top-right corner and use a desktop PDF viewer to open hyperlinks.</a:t>
+            </a:r>
+            <a:endParaRPr lang="en-US" sz="2400" i="1" dirty="0">
+              <a:solidFill>
+                <a:srgbClr val="000000"/>
+              </a:solidFill>
+              <a:sym typeface="Arial"/>
+            </a:endParaRPr>
           </a:p>
         </p:txBody>
       </p:sp>
@@ -2146,7 +2416,7 @@
           <p:nvPr/>
         </p:nvPicPr>
         <p:blipFill>
-          <a:blip r:embed="rId3">
+          <a:blip r:embed="rId4">
             <a:alphaModFix/>
           </a:blip>
           <a:stretch>
@@ -2155,8 +2425,8 @@
         </p:blipFill>
         <p:spPr>
           <a:xfrm>
-            <a:off y="2251425" x="4674800"/>
-            <a:ext cy="381000" cx="1333500"/>
+            <a:off x="4674800" y="2251425"/>
+            <a:ext cx="1333500" cy="381000"/>
           </a:xfrm>
           <a:prstGeom prst="rect">
             <a:avLst/>
@@ -2172,51 +2442,51 @@
   <p:clrMapOvr>
     <a:masterClrMapping/>
   </p:clrMapOvr>
-  <p:transition spd="slow">
+  <p:transition xmlns:p14="http://schemas.microsoft.com/office/powerpoint/2010/main" spd="slow">
     <p:cut/>
   </p:transition>
 </p:sld>
 </file>
 
 <file path=ppt/theme/theme1.xml><?xml version="1.0" encoding="utf-8"?>
-<a:theme xmlns:a="http://schemas.openxmlformats.org/drawingml/2006/main" xmlns:r="http://schemas.openxmlformats.org/officeDocument/2006/relationships" name="Office Theme">
+<a:theme xmlns:a="http://schemas.openxmlformats.org/drawingml/2006/main" name="Custom Theme">
   <a:themeElements>
-    <a:clrScheme name="Office">
+    <a:clrScheme name="blank">
       <a:dk1>
-        <a:sysClr val="windowText" lastClr="000000"/>
+        <a:srgbClr val="000000"/>
       </a:dk1>
       <a:lt1>
-        <a:sysClr val="window" lastClr="FFFFFF"/>
+        <a:srgbClr val="FFFFFF"/>
       </a:lt1>
       <a:dk2>
-        <a:srgbClr val="1F497D"/>
+        <a:srgbClr val="073763"/>
       </a:dk2>
       <a:lt2>
-        <a:srgbClr val="EEECE1"/>
+        <a:srgbClr val="CFE2F3"/>
       </a:lt2>
       <a:accent1>
-        <a:srgbClr val="4F81BD"/>
+        <a:srgbClr val="404040"/>
       </a:accent1>
       <a:accent2>
-        <a:srgbClr val="C0504D"/>
+        <a:srgbClr val="808080"/>
       </a:accent2>
       <a:accent3>
-        <a:srgbClr val="9BBB59"/>
+        <a:srgbClr val="C0C0C0"/>
       </a:accent3>
       <a:accent4>
-        <a:srgbClr val="8064A2"/>
+        <a:srgbClr val="396187"/>
       </a:accent4>
       <a:accent5>
-        <a:srgbClr val="4BACC6"/>
+        <a:srgbClr val="6B8CAB"/>
       </a:accent5>
       <a:accent6>
-        <a:srgbClr val="F79646"/>
+        <a:srgbClr val="9DB7CF"/>
       </a:accent6>
       <a:hlink>
-        <a:srgbClr val="0000FF"/>
+        <a:srgbClr val="0000EE"/>
       </a:hlink>
       <a:folHlink>
-        <a:srgbClr val="800080"/>
+        <a:srgbClr val="551A8B"/>
       </a:folHlink>
     </a:clrScheme>
     <a:fontScheme name="Office">
@@ -2224,69 +2494,69 @@
         <a:latin typeface="Arial"/>
         <a:ea typeface=""/>
         <a:cs typeface=""/>
-        <a:font typeface="ＭＳ Ｐゴシック" script="Jpan"/>
-        <a:font typeface="맑은 고딕" script="Hang"/>
-        <a:font typeface="宋体" script="Hans"/>
-        <a:font typeface="新細明體" script="Hant"/>
-        <a:font typeface="Times New Roman" script="Arab"/>
-        <a:font typeface="Times New Roman" script="Hebr"/>
-        <a:font typeface="Angsana New" script="Thai"/>
-        <a:font typeface="Nyala" script="Ethi"/>
-        <a:font typeface="Vrinda" script="Beng"/>
-        <a:font typeface="Shruti" script="Gujr"/>
-        <a:font typeface="MoolBoran" script="Khmr"/>
-        <a:font typeface="Tunga" script="Knda"/>
-        <a:font typeface="Raavi" script="Guru"/>
-        <a:font typeface="Euphemia" script="Cans"/>
-        <a:font typeface="Plantagenet Cherokee" script="Cher"/>
-        <a:font typeface="Microsoft Yi Baiti" script="Yiii"/>
-        <a:font typeface="Microsoft Himalaya" script="Tibt"/>
-        <a:font typeface="MV Boli" script="Thaa"/>
-        <a:font typeface="Mangal" script="Deva"/>
-        <a:font typeface="Gautami" script="Telu"/>
-        <a:font typeface="Latha" script="Taml"/>
-        <a:font typeface="Estrangelo Edessa" script="Syrc"/>
-        <a:font typeface="Kalinga" script="Orya"/>
-        <a:font typeface="Kartika" script="Mlym"/>
-        <a:font typeface="DokChampa" script="Laoo"/>
-        <a:font typeface="Iskoola Pota" script="Sinh"/>
-        <a:font typeface="Mongolian Baiti" script="Mong"/>
-        <a:font typeface="Times New Roman" script="Viet"/>
-        <a:font typeface="Microsoft Uighur" script="Uigh"/>
+        <a:font script="Jpan" typeface="ＭＳ Ｐゴシック"/>
+        <a:font script="Hang" typeface="맑은 고딕"/>
+        <a:font script="Hans" typeface="宋体"/>
+        <a:font script="Hant" typeface="新細明體"/>
+        <a:font script="Arab" typeface="Times New Roman"/>
+        <a:font script="Hebr" typeface="Times New Roman"/>
+        <a:font script="Thai" typeface="Angsana New"/>
+        <a:font script="Ethi" typeface="Nyala"/>
+        <a:font script="Beng" typeface="Vrinda"/>
+        <a:font script="Gujr" typeface="Shruti"/>
+        <a:font script="Khmr" typeface="MoolBoran"/>
+        <a:font script="Knda" typeface="Tunga"/>
+        <a:font script="Guru" typeface="Raavi"/>
+        <a:font script="Cans" typeface="Euphemia"/>
+        <a:font script="Cher" typeface="Plantagenet Cherokee"/>
+        <a:font script="Yiii" typeface="Microsoft Yi Baiti"/>
+        <a:font script="Tibt" typeface="Microsoft Himalaya"/>
+        <a:font script="Thaa" typeface="MV Boli"/>
+        <a:font script="Deva" typeface="Mangal"/>
+        <a:font script="Telu" typeface="Gautami"/>
+        <a:font script="Taml" typeface="Latha"/>
+        <a:font script="Syrc" typeface="Estrangelo Edessa"/>
+        <a:font script="Orya" typeface="Kalinga"/>
+        <a:font script="Mlym" typeface="Kartika"/>
+        <a:font script="Laoo" typeface="DokChampa"/>
+        <a:font script="Sinh" typeface="Iskoola Pota"/>
+        <a:font script="Mong" typeface="Mongolian Baiti"/>
+        <a:font script="Viet" typeface="Times New Roman"/>
+        <a:font script="Uigh" typeface="Microsoft Uighur"/>
       </a:majorFont>
       <a:minorFont>
         <a:latin typeface="Arial"/>
         <a:ea typeface=""/>
         <a:cs typeface=""/>
-        <a:font typeface="ＭＳ Ｐゴシック" script="Jpan"/>
-        <a:font typeface="맑은 고딕" script="Hang"/>
-        <a:font typeface="宋体" script="Hans"/>
-        <a:font typeface="新細明體" script="Hant"/>
-        <a:font typeface="Times New Roman" script="Arab"/>
-        <a:font typeface="Times New Roman" script="Hebr"/>
-        <a:font typeface="Angsana New" script="Thai"/>
-        <a:font typeface="Nyala" script="Ethi"/>
-        <a:font typeface="Vrinda" script="Beng"/>
-        <a:font typeface="Shruti" script="Gujr"/>
-        <a:font typeface="MoolBoran" script="Khmr"/>
-        <a:font typeface="Tunga" script="Knda"/>
-        <a:font typeface="Raavi" script="Guru"/>
-        <a:font typeface="Euphemia" script="Cans"/>
-        <a:font typeface="Plantagenet Cherokee" script="Cher"/>
-        <a:font typeface="Microsoft Yi Baiti" script="Yiii"/>
-        <a:font typeface="Microsoft Himalaya" script="Tibt"/>
-        <a:font typeface="MV Boli" script="Thaa"/>
-        <a:font typeface="Mangal" script="Deva"/>
-        <a:font typeface="Gautami" script="Telu"/>
-        <a:font typeface="Latha" script="Taml"/>
-        <a:font typeface="Estrangelo Edessa" script="Syrc"/>
-        <a:font typeface="Kalinga" script="Orya"/>
-        <a:font typeface="Kartika" script="Mlym"/>
-        <a:font typeface="DokChampa" script="Laoo"/>
-        <a:font typeface="Iskoola Pota" script="Sinh"/>
-        <a:font typeface="Mongolian Baiti" script="Mong"/>
-        <a:font typeface="Times New Roman" script="Viet"/>
-        <a:font typeface="Microsoft Uighur" script="Uigh"/>
+        <a:font script="Jpan" typeface="ＭＳ Ｐゴシック"/>
+        <a:font script="Hang" typeface="맑은 고딕"/>
+        <a:font script="Hans" typeface="宋体"/>
+        <a:font script="Hant" typeface="新細明體"/>
+        <a:font script="Arab" typeface="Times New Roman"/>
+        <a:font script="Hebr" typeface="Times New Roman"/>
+        <a:font script="Thai" typeface="Angsana New"/>
+        <a:font script="Ethi" typeface="Nyala"/>
+        <a:font script="Beng" typeface="Vrinda"/>
+        <a:font script="Gujr" typeface="Shruti"/>
+        <a:font script="Khmr" typeface="MoolBoran"/>
+        <a:font script="Knda" typeface="Tunga"/>
+        <a:font script="Guru" typeface="Raavi"/>
+        <a:font script="Cans" typeface="Euphemia"/>
+        <a:font script="Cher" typeface="Plantagenet Cherokee"/>
+        <a:font script="Yiii" typeface="Microsoft Yi Baiti"/>
+        <a:font script="Tibt" typeface="Microsoft Himalaya"/>
+        <a:font script="Thaa" typeface="MV Boli"/>
+        <a:font script="Deva" typeface="Mangal"/>
+        <a:font script="Telu" typeface="Gautami"/>
+        <a:font script="Taml" typeface="Latha"/>
+        <a:font script="Syrc" typeface="Estrangelo Edessa"/>
+        <a:font script="Orya" typeface="Kalinga"/>
+        <a:font script="Mlym" typeface="Kartika"/>
+        <a:font script="Laoo" typeface="DokChampa"/>
+        <a:font script="Sinh" typeface="Iskoola Pota"/>
+        <a:font script="Mong" typeface="Mongolian Baiti"/>
+        <a:font script="Viet" typeface="Times New Roman"/>
+        <a:font script="Uigh" typeface="Microsoft Uighur"/>
       </a:minorFont>
     </a:fontScheme>
     <a:fmtScheme name="Office">
@@ -2338,7 +2608,7 @@
         </a:gradFill>
       </a:fillStyleLst>
       <a:lnStyleLst>
-        <a:ln w="9525" algn="ctr" cap="flat" cmpd="sng">
+        <a:ln w="9525" cap="flat" cmpd="sng" algn="ctr">
           <a:solidFill>
             <a:schemeClr val="phClr">
               <a:shade val="95000"/>
@@ -2347,13 +2617,13 @@
           </a:solidFill>
           <a:prstDash val="solid"/>
         </a:ln>
-        <a:ln w="25400" algn="ctr" cap="flat" cmpd="sng">
+        <a:ln w="25400" cap="flat" cmpd="sng" algn="ctr">
           <a:solidFill>
             <a:schemeClr val="phClr"/>
           </a:solidFill>
           <a:prstDash val="solid"/>
         </a:ln>
-        <a:ln w="38100" algn="ctr" cap="flat" cmpd="sng">
+        <a:ln w="38100" cap="flat" cmpd="sng" algn="ctr">
           <a:solidFill>
             <a:schemeClr val="phClr"/>
           </a:solidFill>
@@ -2363,7 +2633,7 @@
       <a:effectStyleLst>
         <a:effectStyle>
           <a:effectLst>
-            <a:outerShdw rotWithShape="0" dir="5400000" blurRad="40000" dist="20000">
+            <a:outerShdw blurRad="40000" dist="20000" dir="5400000" rotWithShape="0">
               <a:srgbClr val="000000">
                 <a:alpha val="38000"/>
               </a:srgbClr>
@@ -2372,7 +2642,7 @@
         </a:effectStyle>
         <a:effectStyle>
           <a:effectLst>
-            <a:outerShdw rotWithShape="0" dir="5400000" blurRad="40000" dist="23000">
+            <a:outerShdw blurRad="40000" dist="23000" dir="5400000" rotWithShape="0">
               <a:srgbClr val="000000">
                 <a:alpha val="35000"/>
               </a:srgbClr>
@@ -2381,7 +2651,7 @@
         </a:effectStyle>
         <a:effectStyle>
           <a:effectLst>
-            <a:outerShdw rotWithShape="0" dir="5400000" blurRad="40000" dist="23000">
+            <a:outerShdw blurRad="40000" dist="23000" dir="5400000" rotWithShape="0">
               <a:srgbClr val="000000">
                 <a:alpha val="35000"/>
               </a:srgbClr>
@@ -2389,10 +2659,10 @@
           </a:effectLst>
           <a:scene3d>
             <a:camera prst="orthographicFront">
-              <a:rot rev="0" lon="0" lat="0"/>
+              <a:rot lat="0" lon="0" rev="0"/>
             </a:camera>
-            <a:lightRig dir="t" rig="threePt">
-              <a:rot rev="1200000" lon="0" lat="0"/>
+            <a:lightRig rig="threePt" dir="t">
+              <a:rot lat="0" lon="0" rev="1200000"/>
             </a:lightRig>
           </a:scene3d>
           <a:sp3d>
@@ -2427,7 +2697,7 @@
             </a:gs>
           </a:gsLst>
           <a:path path="circle">
-            <a:fillToRect t="-80000" b="180000" r="50000" l="50000"/>
+            <a:fillToRect l="50000" t="-80000" r="50000" b="180000"/>
           </a:path>
         </a:gradFill>
         <a:gradFill rotWithShape="1">
@@ -2446,57 +2716,19 @@
             </a:gs>
           </a:gsLst>
           <a:path path="circle">
-            <a:fillToRect t="50000" b="50000" r="50000" l="50000"/>
+            <a:fillToRect l="50000" t="50000" r="50000" b="50000"/>
           </a:path>
         </a:gradFill>
       </a:bgFillStyleLst>
     </a:fmtScheme>
   </a:themeElements>
-  <a:objectDefaults>
-    <a:spDef>
-      <a:spPr/>
-      <a:bodyPr/>
-      <a:lstStyle/>
-      <a:style>
-        <a:lnRef idx="1">
-          <a:schemeClr val="accent1"/>
-        </a:lnRef>
-        <a:fillRef idx="3">
-          <a:schemeClr val="accent1"/>
-        </a:fillRef>
-        <a:effectRef idx="2">
-          <a:schemeClr val="accent1"/>
-        </a:effectRef>
-        <a:fontRef idx="minor">
-          <a:schemeClr val="lt1"/>
-        </a:fontRef>
-      </a:style>
-    </a:spDef>
-    <a:lnDef>
-      <a:spPr/>
-      <a:bodyPr/>
-      <a:lstStyle/>
-      <a:style>
-        <a:lnRef idx="2">
-          <a:schemeClr val="accent1"/>
-        </a:lnRef>
-        <a:fillRef idx="0">
-          <a:schemeClr val="accent1"/>
-        </a:fillRef>
-        <a:effectRef idx="1">
-          <a:schemeClr val="accent1"/>
-        </a:effectRef>
-        <a:fontRef idx="minor">
-          <a:schemeClr val="tx1"/>
-        </a:fontRef>
-      </a:style>
-    </a:lnDef>
-  </a:objectDefaults>
+  <a:objectDefaults/>
+  <a:extraClrSchemeLst/>
 </a:theme>
 </file>
 
 <file path=ppt/theme/theme2.xml><?xml version="1.0" encoding="utf-8"?>
-<a:theme xmlns:a="http://schemas.openxmlformats.org/drawingml/2006/main" xmlns:r="http://schemas.openxmlformats.org/officeDocument/2006/relationships" name="Custom Theme">
+<a:theme xmlns:a="http://schemas.openxmlformats.org/drawingml/2006/main" name="Custom Theme">
   <a:themeElements>
     <a:clrScheme name="Default">
       <a:dk1>
@@ -2541,69 +2773,69 @@
         <a:latin typeface="Arial"/>
         <a:ea typeface=""/>
         <a:cs typeface=""/>
-        <a:font typeface="ＭＳ Ｐゴシック" script="Jpan"/>
-        <a:font typeface="맑은 고딕" script="Hang"/>
-        <a:font typeface="宋体" script="Hans"/>
-        <a:font typeface="新細明體" script="Hant"/>
-        <a:font typeface="Times New Roman" script="Arab"/>
-        <a:font typeface="Times New Roman" script="Hebr"/>
-        <a:font typeface="Angsana New" script="Thai"/>
-        <a:font typeface="Nyala" script="Ethi"/>
-        <a:font typeface="Vrinda" script="Beng"/>
-        <a:font typeface="Shruti" script="Gujr"/>
-        <a:font typeface="MoolBoran" script="Khmr"/>
-        <a:font typeface="Tunga" script="Knda"/>
-        <a:font typeface="Raavi" script="Guru"/>
-        <a:font typeface="Euphemia" script="Cans"/>
-        <a:font typeface="Plantagenet Cherokee" script="Cher"/>
-        <a:font typeface="Microsoft Yi Baiti" script="Yiii"/>
-        <a:font typeface="Microsoft Himalaya" script="Tibt"/>
-        <a:font typeface="MV Boli" script="Thaa"/>
-        <a:font typeface="Mangal" script="Deva"/>
-        <a:font typeface="Gautami" script="Telu"/>
-        <a:font typeface="Latha" script="Taml"/>
-        <a:font typeface="Estrangelo Edessa" script="Syrc"/>
-        <a:font typeface="Kalinga" script="Orya"/>
-        <a:font typeface="Kartika" script="Mlym"/>
-        <a:font typeface="DokChampa" script="Laoo"/>
-        <a:font typeface="Iskoola Pota" script="Sinh"/>
-        <a:font typeface="Mongolian Baiti" script="Mong"/>
-        <a:font typeface="Times New Roman" script="Viet"/>
-        <a:font typeface="Microsoft Uighur" script="Uigh"/>
+        <a:font script="Jpan" typeface="ＭＳ Ｐゴシック"/>
+        <a:font script="Hang" typeface="맑은 고딕"/>
+        <a:font script="Hans" typeface="宋体"/>
+        <a:font script="Hant" typeface="新細明體"/>
+        <a:font script="Arab" typeface="Times New Roman"/>
+        <a:font script="Hebr" typeface="Times New Roman"/>
+        <a:font script="Thai" typeface="Angsana New"/>
+        <a:font script="Ethi" typeface="Nyala"/>
+        <a:font script="Beng" typeface="Vrinda"/>
+        <a:font script="Gujr" typeface="Shruti"/>
+        <a:font script="Khmr" typeface="MoolBoran"/>
+        <a:font script="Knda" typeface="Tunga"/>
+        <a:font script="Guru" typeface="Raavi"/>
+        <a:font script="Cans" typeface="Euphemia"/>
+        <a:font script="Cher" typeface="Plantagenet Cherokee"/>
+        <a:font script="Yiii" typeface="Microsoft Yi Baiti"/>
+        <a:font script="Tibt" typeface="Microsoft Himalaya"/>
+        <a:font script="Thaa" typeface="MV Boli"/>
+        <a:font script="Deva" typeface="Mangal"/>
+        <a:font script="Telu" typeface="Gautami"/>
+        <a:font script="Taml" typeface="Latha"/>
+        <a:font script="Syrc" typeface="Estrangelo Edessa"/>
+        <a:font script="Orya" typeface="Kalinga"/>
+        <a:font script="Mlym" typeface="Kartika"/>
+        <a:font script="Laoo" typeface="DokChampa"/>
+        <a:font script="Sinh" typeface="Iskoola Pota"/>
+        <a:font script="Mong" typeface="Mongolian Baiti"/>
+        <a:font script="Viet" typeface="Times New Roman"/>
+        <a:font script="Uigh" typeface="Microsoft Uighur"/>
       </a:majorFont>
       <a:minorFont>
         <a:latin typeface="Arial"/>
         <a:ea typeface=""/>
         <a:cs typeface=""/>
-        <a:font typeface="ＭＳ Ｐゴシック" script="Jpan"/>
-        <a:font typeface="맑은 고딕" script="Hang"/>
-        <a:font typeface="宋体" script="Hans"/>
-        <a:font typeface="新細明體" script="Hant"/>
-        <a:font typeface="Times New Roman" script="Arab"/>
-        <a:font typeface="Times New Roman" script="Hebr"/>
-        <a:font typeface="Angsana New" script="Thai"/>
-        <a:font typeface="Nyala" script="Ethi"/>
-        <a:font typeface="Vrinda" script="Beng"/>
-        <a:font typeface="Shruti" script="Gujr"/>
-        <a:font typeface="MoolBoran" script="Khmr"/>
-        <a:font typeface="Tunga" script="Knda"/>
-        <a:font typeface="Raavi" script="Guru"/>
-        <a:font typeface="Euphemia" script="Cans"/>
-        <a:font typeface="Plantagenet Cherokee" script="Cher"/>
-        <a:font typeface="Microsoft Yi Baiti" script="Yiii"/>
-        <a:font typeface="Microsoft Himalaya" script="Tibt"/>
-        <a:font typeface="MV Boli" script="Thaa"/>
-        <a:font typeface="Mangal" script="Deva"/>
-        <a:font typeface="Gautami" script="Telu"/>
-        <a:font typeface="Latha" script="Taml"/>
-        <a:font typeface="Estrangelo Edessa" script="Syrc"/>
-        <a:font typeface="Kalinga" script="Orya"/>
-        <a:font typeface="Kartika" script="Mlym"/>
-        <a:font typeface="DokChampa" script="Laoo"/>
-        <a:font typeface="Iskoola Pota" script="Sinh"/>
-        <a:font typeface="Mongolian Baiti" script="Mong"/>
-        <a:font typeface="Times New Roman" script="Viet"/>
-        <a:font typeface="Microsoft Uighur" script="Uigh"/>
+        <a:font script="Jpan" typeface="ＭＳ Ｐゴシック"/>
+        <a:font script="Hang" typeface="맑은 고딕"/>
+        <a:font script="Hans" typeface="宋体"/>
+        <a:font script="Hant" typeface="新細明體"/>
+        <a:font script="Arab" typeface="Times New Roman"/>
+        <a:font script="Hebr" typeface="Times New Roman"/>
+        <a:font script="Thai" typeface="Angsana New"/>
+        <a:font script="Ethi" typeface="Nyala"/>
+        <a:font script="Beng" typeface="Vrinda"/>
+        <a:font script="Gujr" typeface="Shruti"/>
+        <a:font script="Khmr" typeface="MoolBoran"/>
+        <a:font script="Knda" typeface="Tunga"/>
+        <a:font script="Guru" typeface="Raavi"/>
+        <a:font script="Cans" typeface="Euphemia"/>
+        <a:font script="Cher" typeface="Plantagenet Cherokee"/>
+        <a:font script="Yiii" typeface="Microsoft Yi Baiti"/>
+        <a:font script="Tibt" typeface="Microsoft Himalaya"/>
+        <a:font script="Thaa" typeface="MV Boli"/>
+        <a:font script="Deva" typeface="Mangal"/>
+        <a:font script="Telu" typeface="Gautami"/>
+        <a:font script="Taml" typeface="Latha"/>
+        <a:font script="Syrc" typeface="Estrangelo Edessa"/>
+        <a:font script="Orya" typeface="Kalinga"/>
+        <a:font script="Mlym" typeface="Kartika"/>
+        <a:font script="Laoo" typeface="DokChampa"/>
+        <a:font script="Sinh" typeface="Iskoola Pota"/>
+        <a:font script="Mong" typeface="Mongolian Baiti"/>
+        <a:font script="Viet" typeface="Times New Roman"/>
+        <a:font script="Uigh" typeface="Microsoft Uighur"/>
       </a:minorFont>
     </a:fontScheme>
     <a:fmtScheme name="Office">
@@ -2655,7 +2887,7 @@
         </a:gradFill>
       </a:fillStyleLst>
       <a:lnStyleLst>
-        <a:ln w="9525" algn="ctr" cap="flat" cmpd="sng">
+        <a:ln w="9525" cap="flat" cmpd="sng" algn="ctr">
           <a:solidFill>
             <a:schemeClr val="phClr">
               <a:shade val="95000"/>
@@ -2664,13 +2896,13 @@
           </a:solidFill>
           <a:prstDash val="solid"/>
         </a:ln>
-        <a:ln w="25400" algn="ctr" cap="flat" cmpd="sng">
+        <a:ln w="25400" cap="flat" cmpd="sng" algn="ctr">
           <a:solidFill>
             <a:schemeClr val="phClr"/>
           </a:solidFill>
           <a:prstDash val="solid"/>
         </a:ln>
-        <a:ln w="38100" algn="ctr" cap="flat" cmpd="sng">
+        <a:ln w="38100" cap="flat" cmpd="sng" algn="ctr">
           <a:solidFill>
             <a:schemeClr val="phClr"/>
           </a:solidFill>
@@ -2680,7 +2912,7 @@
       <a:effectStyleLst>
         <a:effectStyle>
           <a:effectLst>
-            <a:outerShdw rotWithShape="0" dir="5400000" blurRad="40000" dist="20000">
+            <a:outerShdw blurRad="40000" dist="20000" dir="5400000" rotWithShape="0">
               <a:srgbClr val="000000">
                 <a:alpha val="38000"/>
               </a:srgbClr>
@@ -2689,7 +2921,7 @@
         </a:effectStyle>
         <a:effectStyle>
           <a:effectLst>
-            <a:outerShdw rotWithShape="0" dir="5400000" blurRad="40000" dist="23000">
+            <a:outerShdw blurRad="40000" dist="23000" dir="5400000" rotWithShape="0">
               <a:srgbClr val="000000">
                 <a:alpha val="35000"/>
               </a:srgbClr>
@@ -2698,7 +2930,7 @@
         </a:effectStyle>
         <a:effectStyle>
           <a:effectLst>
-            <a:outerShdw rotWithShape="0" dir="5400000" blurRad="40000" dist="23000">
+            <a:outerShdw blurRad="40000" dist="23000" dir="5400000" rotWithShape="0">
               <a:srgbClr val="000000">
                 <a:alpha val="35000"/>
               </a:srgbClr>
@@ -2706,10 +2938,10 @@
           </a:effectLst>
           <a:scene3d>
             <a:camera prst="orthographicFront">
-              <a:rot rev="0" lon="0" lat="0"/>
+              <a:rot lat="0" lon="0" rev="0"/>
             </a:camera>
-            <a:lightRig dir="t" rig="threePt">
-              <a:rot rev="1200000" lon="0" lat="0"/>
+            <a:lightRig rig="threePt" dir="t">
+              <a:rot lat="0" lon="0" rev="1200000"/>
             </a:lightRig>
           </a:scene3d>
           <a:sp3d>
@@ -2744,7 +2976,7 @@
             </a:gs>
           </a:gsLst>
           <a:path path="circle">
-            <a:fillToRect t="-80000" b="180000" r="50000" l="50000"/>
+            <a:fillToRect l="50000" t="-80000" r="50000" b="180000"/>
           </a:path>
         </a:gradFill>
         <a:gradFill rotWithShape="1">
@@ -2763,288 +2995,13 @@
             </a:gs>
           </a:gsLst>
           <a:path path="circle">
-            <a:fillToRect t="50000" b="50000" r="50000" l="50000"/>
+            <a:fillToRect l="50000" t="50000" r="50000" b="50000"/>
           </a:path>
         </a:gradFill>
       </a:bgFillStyleLst>
     </a:fmtScheme>
   </a:themeElements>
-</a:theme>
-</file>
-
-<file path=ppt/theme/theme3.xml><?xml version="1.0" encoding="utf-8"?>
-<a:theme xmlns:a="http://schemas.openxmlformats.org/drawingml/2006/main" xmlns:r="http://schemas.openxmlformats.org/officeDocument/2006/relationships" name="Custom Theme">
-  <a:themeElements>
-    <a:clrScheme name="blank">
-      <a:dk1>
-        <a:srgbClr val="000000"/>
-      </a:dk1>
-      <a:lt1>
-        <a:srgbClr val="FFFFFF"/>
-      </a:lt1>
-      <a:dk2>
-        <a:srgbClr val="073763"/>
-      </a:dk2>
-      <a:lt2>
-        <a:srgbClr val="CFE2F3"/>
-      </a:lt2>
-      <a:accent1>
-        <a:srgbClr val="404040"/>
-      </a:accent1>
-      <a:accent2>
-        <a:srgbClr val="808080"/>
-      </a:accent2>
-      <a:accent3>
-        <a:srgbClr val="C0C0C0"/>
-      </a:accent3>
-      <a:accent4>
-        <a:srgbClr val="396187"/>
-      </a:accent4>
-      <a:accent5>
-        <a:srgbClr val="6B8CAB"/>
-      </a:accent5>
-      <a:accent6>
-        <a:srgbClr val="9DB7CF"/>
-      </a:accent6>
-      <a:hlink>
-        <a:srgbClr val="0000EE"/>
-      </a:hlink>
-      <a:folHlink>
-        <a:srgbClr val="551A8B"/>
-      </a:folHlink>
-    </a:clrScheme>
-    <a:fontScheme name="Office">
-      <a:majorFont>
-        <a:latin typeface="Arial"/>
-        <a:ea typeface=""/>
-        <a:cs typeface=""/>
-        <a:font typeface="ＭＳ Ｐゴシック" script="Jpan"/>
-        <a:font typeface="맑은 고딕" script="Hang"/>
-        <a:font typeface="宋体" script="Hans"/>
-        <a:font typeface="新細明體" script="Hant"/>
-        <a:font typeface="Times New Roman" script="Arab"/>
-        <a:font typeface="Times New Roman" script="Hebr"/>
-        <a:font typeface="Angsana New" script="Thai"/>
-        <a:font typeface="Nyala" script="Ethi"/>
-        <a:font typeface="Vrinda" script="Beng"/>
-        <a:font typeface="Shruti" script="Gujr"/>
-        <a:font typeface="MoolBoran" script="Khmr"/>
-        <a:font typeface="Tunga" script="Knda"/>
-        <a:font typeface="Raavi" script="Guru"/>
-        <a:font typeface="Euphemia" script="Cans"/>
-        <a:font typeface="Plantagenet Cherokee" script="Cher"/>
-        <a:font typeface="Microsoft Yi Baiti" script="Yiii"/>
-        <a:font typeface="Microsoft Himalaya" script="Tibt"/>
-        <a:font typeface="MV Boli" script="Thaa"/>
-        <a:font typeface="Mangal" script="Deva"/>
-        <a:font typeface="Gautami" script="Telu"/>
-        <a:font typeface="Latha" script="Taml"/>
-        <a:font typeface="Estrangelo Edessa" script="Syrc"/>
-        <a:font typeface="Kalinga" script="Orya"/>
-        <a:font typeface="Kartika" script="Mlym"/>
-        <a:font typeface="DokChampa" script="Laoo"/>
-        <a:font typeface="Iskoola Pota" script="Sinh"/>
-        <a:font typeface="Mongolian Baiti" script="Mong"/>
-        <a:font typeface="Times New Roman" script="Viet"/>
-        <a:font typeface="Microsoft Uighur" script="Uigh"/>
-      </a:majorFont>
-      <a:minorFont>
-        <a:latin typeface="Arial"/>
-        <a:ea typeface=""/>
-        <a:cs typeface=""/>
-        <a:font typeface="ＭＳ Ｐゴシック" script="Jpan"/>
-        <a:font typeface="맑은 고딕" script="Hang"/>
-        <a:font typeface="宋体" script="Hans"/>
-        <a:font typeface="新細明體" script="Hant"/>
-        <a:font typeface="Times New Roman" script="Arab"/>
-        <a:font typeface="Times New Roman" script="Hebr"/>
-        <a:font typeface="Angsana New" script="Thai"/>
-        <a:font typeface="Nyala" script="Ethi"/>
-        <a:font typeface="Vrinda" script="Beng"/>
-        <a:font typeface="Shruti" script="Gujr"/>
-        <a:font typeface="MoolBoran" script="Khmr"/>
-        <a:font typeface="Tunga" script="Knda"/>
-        <a:font typeface="Raavi" script="Guru"/>
-        <a:font typeface="Euphemia" script="Cans"/>
-        <a:font typeface="Plantagenet Cherokee" script="Cher"/>
-        <a:font typeface="Microsoft Yi Baiti" script="Yiii"/>
-        <a:font typeface="Microsoft Himalaya" script="Tibt"/>
-        <a:font typeface="MV Boli" script="Thaa"/>
-        <a:font typeface="Mangal" script="Deva"/>
-        <a:font typeface="Gautami" script="Telu"/>
-        <a:font typeface="Latha" script="Taml"/>
-        <a:font typeface="Estrangelo Edessa" script="Syrc"/>
-        <a:font typeface="Kalinga" script="Orya"/>
-        <a:font typeface="Kartika" script="Mlym"/>
-        <a:font typeface="DokChampa" script="Laoo"/>
-        <a:font typeface="Iskoola Pota" script="Sinh"/>
-        <a:font typeface="Mongolian Baiti" script="Mong"/>
-        <a:font typeface="Times New Roman" script="Viet"/>
-        <a:font typeface="Microsoft Uighur" script="Uigh"/>
-      </a:minorFont>
-    </a:fontScheme>
-    <a:fmtScheme name="Office">
-      <a:fillStyleLst>
-        <a:solidFill>
-          <a:schemeClr val="phClr"/>
-        </a:solidFill>
-        <a:gradFill rotWithShape="1">
-          <a:gsLst>
-            <a:gs pos="0">
-              <a:schemeClr val="phClr">
-                <a:tint val="50000"/>
-                <a:satMod val="300000"/>
-              </a:schemeClr>
-            </a:gs>
-            <a:gs pos="35000">
-              <a:schemeClr val="phClr">
-                <a:tint val="37000"/>
-                <a:satMod val="300000"/>
-              </a:schemeClr>
-            </a:gs>
-            <a:gs pos="100000">
-              <a:schemeClr val="phClr">
-                <a:tint val="15000"/>
-                <a:satMod val="350000"/>
-              </a:schemeClr>
-            </a:gs>
-          </a:gsLst>
-          <a:lin ang="16200000" scaled="1"/>
-        </a:gradFill>
-        <a:gradFill rotWithShape="1">
-          <a:gsLst>
-            <a:gs pos="0">
-              <a:schemeClr val="phClr">
-                <a:tint val="100000"/>
-                <a:shade val="100000"/>
-                <a:satMod val="130000"/>
-              </a:schemeClr>
-            </a:gs>
-            <a:gs pos="100000">
-              <a:schemeClr val="phClr">
-                <a:tint val="50000"/>
-                <a:shade val="100000"/>
-                <a:satMod val="350000"/>
-              </a:schemeClr>
-            </a:gs>
-          </a:gsLst>
-          <a:lin ang="16200000" scaled="0"/>
-        </a:gradFill>
-      </a:fillStyleLst>
-      <a:lnStyleLst>
-        <a:ln w="9525" algn="ctr" cap="flat" cmpd="sng">
-          <a:solidFill>
-            <a:schemeClr val="phClr">
-              <a:shade val="95000"/>
-              <a:satMod val="105000"/>
-            </a:schemeClr>
-          </a:solidFill>
-          <a:prstDash val="solid"/>
-        </a:ln>
-        <a:ln w="25400" algn="ctr" cap="flat" cmpd="sng">
-          <a:solidFill>
-            <a:schemeClr val="phClr"/>
-          </a:solidFill>
-          <a:prstDash val="solid"/>
-        </a:ln>
-        <a:ln w="38100" algn="ctr" cap="flat" cmpd="sng">
-          <a:solidFill>
-            <a:schemeClr val="phClr"/>
-          </a:solidFill>
-          <a:prstDash val="solid"/>
-        </a:ln>
-      </a:lnStyleLst>
-      <a:effectStyleLst>
-        <a:effectStyle>
-          <a:effectLst>
-            <a:outerShdw rotWithShape="0" dir="5400000" blurRad="40000" dist="20000">
-              <a:srgbClr val="000000">
-                <a:alpha val="38000"/>
-              </a:srgbClr>
-            </a:outerShdw>
-          </a:effectLst>
-        </a:effectStyle>
-        <a:effectStyle>
-          <a:effectLst>
-            <a:outerShdw rotWithShape="0" dir="5400000" blurRad="40000" dist="23000">
-              <a:srgbClr val="000000">
-                <a:alpha val="35000"/>
-              </a:srgbClr>
-            </a:outerShdw>
-          </a:effectLst>
-        </a:effectStyle>
-        <a:effectStyle>
-          <a:effectLst>
-            <a:outerShdw rotWithShape="0" dir="5400000" blurRad="40000" dist="23000">
-              <a:srgbClr val="000000">
-                <a:alpha val="35000"/>
-              </a:srgbClr>
-            </a:outerShdw>
-          </a:effectLst>
-          <a:scene3d>
-            <a:camera prst="orthographicFront">
-              <a:rot rev="0" lon="0" lat="0"/>
-            </a:camera>
-            <a:lightRig dir="t" rig="threePt">
-              <a:rot rev="1200000" lon="0" lat="0"/>
-            </a:lightRig>
-          </a:scene3d>
-          <a:sp3d>
-            <a:bevelT w="63500" h="25400"/>
-          </a:sp3d>
-        </a:effectStyle>
-      </a:effectStyleLst>
-      <a:bgFillStyleLst>
-        <a:solidFill>
-          <a:schemeClr val="phClr"/>
-        </a:solidFill>
-        <a:gradFill rotWithShape="1">
-          <a:gsLst>
-            <a:gs pos="0">
-              <a:schemeClr val="phClr">
-                <a:tint val="40000"/>
-                <a:satMod val="350000"/>
-              </a:schemeClr>
-            </a:gs>
-            <a:gs pos="40000">
-              <a:schemeClr val="phClr">
-                <a:tint val="45000"/>
-                <a:shade val="99000"/>
-                <a:satMod val="350000"/>
-              </a:schemeClr>
-            </a:gs>
-            <a:gs pos="100000">
-              <a:schemeClr val="phClr">
-                <a:shade val="20000"/>
-                <a:satMod val="255000"/>
-              </a:schemeClr>
-            </a:gs>
-          </a:gsLst>
-          <a:path path="circle">
-            <a:fillToRect t="-80000" b="180000" r="50000" l="50000"/>
-          </a:path>
-        </a:gradFill>
-        <a:gradFill rotWithShape="1">
-          <a:gsLst>
-            <a:gs pos="0">
-              <a:schemeClr val="phClr">
-                <a:tint val="80000"/>
-                <a:satMod val="300000"/>
-              </a:schemeClr>
-            </a:gs>
-            <a:gs pos="100000">
-              <a:schemeClr val="phClr">
-                <a:shade val="30000"/>
-                <a:satMod val="200000"/>
-              </a:schemeClr>
-            </a:gs>
-          </a:gsLst>
-          <a:path path="circle">
-            <a:fillToRect t="50000" b="50000" r="50000" l="50000"/>
-          </a:path>
-        </a:gradFill>
-      </a:bgFillStyleLst>
-    </a:fmtScheme>
-  </a:themeElements>
+  <a:objectDefaults/>
+  <a:extraClrSchemeLst/>
 </a:theme>
 </file>
</xml_diff>

<commit_message>
Replace ViewerJS with the viewer that ships with pdf.js
</commit_message>
<xml_diff>
--- a/doc/website/doc/slides.pptx
+++ b/doc/website/doc/slides.pptx
@@ -2086,7 +2086,7 @@
         <p:spPr>
           <a:xfrm>
             <a:off x="304800" y="1524000"/>
-            <a:ext cx="9624750" cy="6201697"/>
+            <a:ext cx="9624750" cy="5616921"/>
           </a:xfrm>
           <a:prstGeom prst="rect">
             <a:avLst/>
@@ -2350,7 +2350,16 @@
             </a:r>
           </a:p>
           <a:p>
-            <a:pPr marL="381000" lvl="0" indent="-203200">
+            <a:pPr marL="381000" marR="0" lvl="0" indent="-203200" rtl="0">
+              <a:lnSpc>
+                <a:spcPct val="100000"/>
+              </a:lnSpc>
+              <a:spcBef>
+                <a:spcPts val="0"/>
+              </a:spcBef>
+              <a:spcAft>
+                <a:spcPts val="0"/>
+              </a:spcAft>
               <a:buClr>
                 <a:srgbClr val="000000"/>
               </a:buClr>
@@ -2367,43 +2376,28 @@
               <a:t>Github</a:t>
             </a:r>
             <a:r>
-              <a:rPr lang="en-US" sz="2400" dirty="0"/>
+              <a:rPr lang="en-US" sz="2400" dirty="0" smtClean="0"/>
               <a:t>: </a:t>
-            </a:r>
-            <a:r>
-              <a:rPr lang="en-US" sz="2400" dirty="0">
-                <a:hlinkClick r:id="rId3"/>
-              </a:rPr>
-              <a:t>https://github.com/apuder/android-</a:t>
             </a:r>
             <a:r>
               <a:rPr lang="en-US" sz="2400" dirty="0" smtClean="0">
                 <a:hlinkClick r:id="rId3"/>
               </a:rPr>
-              <a:t>tutorials</a:t>
+              <a:t>https://github.com/apuder/android</a:t>
             </a:r>
             <a:r>
-              <a:rPr lang="en-US" sz="2400" dirty="0" smtClean="0"/>
-              <a:t> </a:t>
+              <a:rPr lang="en-US" sz="2400" smtClean="0">
+                <a:hlinkClick r:id="rId3"/>
+              </a:rPr>
+              <a:t>-tutorials</a:t>
             </a:r>
-            <a:br>
-              <a:rPr lang="en-US" sz="2400" dirty="0" smtClean="0"/>
-            </a:br>
-            <a:r>
-              <a:rPr lang="en-US" sz="1200" i="1" dirty="0" smtClean="0"/>
-              <a:t>Note: unfortunately the PDF viewer used for this site does not support hyperlinks (yet). Download the PDF via</a:t>
-            </a:r>
-            <a:br>
-              <a:rPr lang="en-US" sz="1200" i="1" dirty="0" smtClean="0"/>
-            </a:br>
-            <a:r>
-              <a:rPr lang="en-US" sz="1200" i="1" dirty="0" smtClean="0"/>
-              <a:t>the download link in the top-right corner and use a desktop PDF viewer to open hyperlinks.</a:t>
-            </a:r>
-            <a:endParaRPr lang="en-US" sz="2400" i="1" dirty="0">
+            <a:endParaRPr lang="en-US" sz="2400" dirty="0" smtClean="0">
               <a:solidFill>
                 <a:srgbClr val="000000"/>
               </a:solidFill>
+              <a:latin typeface="Arial"/>
+              <a:ea typeface="Arial"/>
+              <a:cs typeface="Arial"/>
               <a:sym typeface="Arial"/>
             </a:endParaRPr>
           </a:p>

</xml_diff>